<commit_message>
Data ingestion slide updates
</commit_message>
<xml_diff>
--- a/Conference_ppt/07-Ingest and load data.pptx
+++ b/Conference_ppt/07-Ingest and load data.pptx
@@ -6,21 +6,23 @@
     <p:sldMasterId id="2147483692" r:id="rId2"/>
   </p:sldMasterIdLst>
   <p:notesMasterIdLst>
-    <p:notesMasterId r:id="rId12"/>
+    <p:notesMasterId r:id="rId14"/>
   </p:notesMasterIdLst>
   <p:handoutMasterIdLst>
-    <p:handoutMasterId r:id="rId13"/>
+    <p:handoutMasterId r:id="rId15"/>
   </p:handoutMasterIdLst>
   <p:sldIdLst>
     <p:sldId id="256" r:id="rId3"/>
     <p:sldId id="418" r:id="rId4"/>
-    <p:sldId id="257" r:id="rId5"/>
-    <p:sldId id="419" r:id="rId6"/>
-    <p:sldId id="258" r:id="rId7"/>
-    <p:sldId id="420" r:id="rId8"/>
-    <p:sldId id="421" r:id="rId9"/>
-    <p:sldId id="424" r:id="rId10"/>
-    <p:sldId id="2076137761" r:id="rId11"/>
+    <p:sldId id="2076137762" r:id="rId5"/>
+    <p:sldId id="257" r:id="rId6"/>
+    <p:sldId id="419" r:id="rId7"/>
+    <p:sldId id="2076137763" r:id="rId8"/>
+    <p:sldId id="258" r:id="rId9"/>
+    <p:sldId id="420" r:id="rId10"/>
+    <p:sldId id="421" r:id="rId11"/>
+    <p:sldId id="424" r:id="rId12"/>
+    <p:sldId id="2076137761" r:id="rId13"/>
   </p:sldIdLst>
   <p:sldSz cx="12192000" cy="6858000"/>
   <p:notesSz cx="6858000" cy="9144000"/>
@@ -235,7 +237,7 @@
           <a:p>
             <a:fld id="{2B56BDA5-FBCC-43E1-957B-02AF36889AD5}" type="datetimeFigureOut">
               <a:rPr lang="en-US" smtClean="0"/>
-              <a:t>11/27/2021</a:t>
+              <a:t>11/28/2021</a:t>
             </a:fld>
             <a:endParaRPr lang="en-US"/>
           </a:p>
@@ -412,7 +414,7 @@
           <a:p>
             <a:fld id="{8F44CDF0-0D54-4AFE-B409-D6358A9BB9A1}" type="datetimeFigureOut">
               <a:rPr lang="en-US" smtClean="0"/>
-              <a:t>11/27/2021</a:t>
+              <a:t>11/28/2021</a:t>
             </a:fld>
             <a:endParaRPr lang="en-US"/>
           </a:p>
@@ -980,7 +982,7 @@
           <a:p>
             <a:fld id="{37E24C93-78CA-4AF0-9E77-825D60ABA46D}" type="slidenum">
               <a:rPr lang="en-US" smtClean="0"/>
-              <a:t>3</a:t>
+              <a:t>4</a:t>
             </a:fld>
             <a:endParaRPr lang="en-US"/>
           </a:p>
@@ -1353,7 +1355,7 @@
           <a:p>
             <a:fld id="{37E24C93-78CA-4AF0-9E77-825D60ABA46D}" type="slidenum">
               <a:rPr lang="en-US" smtClean="0"/>
-              <a:t>4</a:t>
+              <a:t>5</a:t>
             </a:fld>
             <a:endParaRPr lang="en-US"/>
           </a:p>
@@ -1417,18 +1419,76 @@
           <a:lstStyle/>
           <a:p>
             <a:r>
-              <a:rPr lang="en-IE" b="1" dirty="0"/>
-              <a:t>Talking Points:</a:t>
-            </a:r>
-          </a:p>
-          <a:p>
-            <a:endParaRPr lang="en-IE" dirty="0"/>
-          </a:p>
-          <a:p>
-            <a:r>
-              <a:rPr lang="en-IE" dirty="0"/>
-              <a:t>Let’s look at how you can ingest data at petabyte-scale using Azure Data Factory or Synapse Pipelines.</a:t>
-            </a:r>
+              <a:rPr lang="en-US" sz="1400" b="1" dirty="0"/>
+              <a:t>TALKING POINTS</a:t>
+            </a:r>
+          </a:p>
+          <a:p>
+            <a:pPr>
+              <a:defRPr/>
+            </a:pPr>
+            <a:endParaRPr lang="en-US" sz="1400" b="1" dirty="0">
+              <a:latin typeface="Segoe UI"/>
+              <a:cs typeface="Segoe UI"/>
+            </a:endParaRPr>
+          </a:p>
+          <a:p>
+            <a:r>
+              <a:rPr lang="en-GB" b="0" i="0" dirty="0">
+                <a:solidFill>
+                  <a:srgbClr val="171717"/>
+                </a:solidFill>
+                <a:effectLst/>
+                <a:latin typeface="Segoe UI"/>
+                <a:cs typeface="Segoe UI"/>
+              </a:rPr>
+              <a:t>TODO: Add speaking points for this slide</a:t>
+            </a:r>
+            <a:endParaRPr lang="en-GB" sz="1200" dirty="0">
+              <a:solidFill>
+                <a:srgbClr val="171717"/>
+              </a:solidFill>
+              <a:latin typeface="Segoe UI"/>
+              <a:cs typeface="Segoe UI"/>
+            </a:endParaRPr>
+          </a:p>
+          <a:p>
+            <a:endParaRPr lang="en-US" dirty="0">
+              <a:solidFill>
+                <a:srgbClr val="000000"/>
+              </a:solidFill>
+              <a:cs typeface="Segoe UI"/>
+            </a:endParaRPr>
+          </a:p>
+          <a:p>
+            <a:r>
+              <a:rPr lang="en-US" sz="1200" b="1" dirty="0"/>
+              <a:t>PRESENTER NOTES AND GUIDANCE</a:t>
+            </a:r>
+          </a:p>
+          <a:p>
+            <a:endParaRPr lang="en-US" sz="1200" dirty="0"/>
+          </a:p>
+          <a:p>
+            <a:r>
+              <a:rPr lang="en-US" sz="1200" dirty="0"/>
+              <a:t>Review:</a:t>
+            </a:r>
+          </a:p>
+          <a:p>
+            <a:r>
+              <a:rPr lang="en-US" sz="1200" dirty="0"/>
+              <a:t>https://docs.microsoft.com/en-us/azure/synapse-analytics/data-integration/concepts-data-factory-differences</a:t>
+            </a:r>
+          </a:p>
+          <a:p>
+            <a:endParaRPr lang="en-GB" dirty="0"/>
+          </a:p>
+          <a:p>
+            <a:endParaRPr lang="en-GB" dirty="0"/>
+          </a:p>
+          <a:p>
+            <a:endParaRPr lang="en-GB" dirty="0"/>
           </a:p>
           <a:p>
             <a:endParaRPr lang="en-GB" dirty="0"/>
@@ -1452,7 +1512,7 @@
           <a:p>
             <a:fld id="{37E24C93-78CA-4AF0-9E77-825D60ABA46D}" type="slidenum">
               <a:rPr lang="en-US" smtClean="0"/>
-              <a:t>5</a:t>
+              <a:t>6</a:t>
             </a:fld>
             <a:endParaRPr lang="en-US"/>
           </a:p>
@@ -1461,7 +1521,7 @@
     </p:spTree>
     <p:extLst>
       <p:ext uri="{BB962C8B-B14F-4D97-AF65-F5344CB8AC3E}">
-        <p14:creationId xmlns:p14="http://schemas.microsoft.com/office/powerpoint/2010/main" val="2053942289"/>
+        <p14:creationId xmlns:p14="http://schemas.microsoft.com/office/powerpoint/2010/main" val="3284867165"/>
       </p:ext>
     </p:extLst>
   </p:cSld>
@@ -1516,76 +1576,18 @@
           <a:lstStyle/>
           <a:p>
             <a:r>
-              <a:rPr lang="en-US" sz="1400" b="1" dirty="0"/>
-              <a:t>TALKING POINTS</a:t>
-            </a:r>
-          </a:p>
-          <a:p>
-            <a:pPr>
-              <a:defRPr/>
-            </a:pPr>
-            <a:endParaRPr lang="en-US" sz="1400" b="1" dirty="0">
-              <a:latin typeface="Segoe UI"/>
-              <a:cs typeface="Segoe UI"/>
-            </a:endParaRPr>
-          </a:p>
-          <a:p>
-            <a:r>
-              <a:rPr lang="en-GB" b="0" i="0" dirty="0">
-                <a:solidFill>
-                  <a:srgbClr val="171717"/>
-                </a:solidFill>
-                <a:effectLst/>
-                <a:latin typeface="Segoe UI"/>
-                <a:cs typeface="Segoe UI"/>
-              </a:rPr>
-              <a:t>Before looking at petabyte-scale ingestion, lets quickly compare Azure Data Factory with Synapse Pipelines. ADF and Synapse Pipelines are essentially the same product, and they share the same code base. However, there are a few differences you should be aware of, most notably that Synapse Pipelines does not allow the use of the SSIS Integration Runtime.</a:t>
-            </a:r>
-            <a:endParaRPr lang="en-GB" sz="1200" dirty="0">
-              <a:solidFill>
-                <a:srgbClr val="171717"/>
-              </a:solidFill>
-              <a:latin typeface="Segoe UI"/>
-              <a:cs typeface="Segoe UI"/>
-            </a:endParaRPr>
-          </a:p>
-          <a:p>
-            <a:endParaRPr lang="en-US" dirty="0">
-              <a:solidFill>
-                <a:srgbClr val="000000"/>
-              </a:solidFill>
-              <a:cs typeface="Segoe UI"/>
-            </a:endParaRPr>
-          </a:p>
-          <a:p>
-            <a:r>
-              <a:rPr lang="en-US" sz="1200" b="1" dirty="0"/>
-              <a:t>PRESENTER NOTES AND GUIDANCE</a:t>
-            </a:r>
-          </a:p>
-          <a:p>
-            <a:endParaRPr lang="en-US" sz="1200" dirty="0"/>
-          </a:p>
-          <a:p>
-            <a:r>
-              <a:rPr lang="en-US" sz="1200" dirty="0"/>
-              <a:t>Review:</a:t>
-            </a:r>
-          </a:p>
-          <a:p>
-            <a:r>
-              <a:rPr lang="en-US" sz="1200" dirty="0"/>
-              <a:t>https://docs.microsoft.com/en-us/azure/synapse-analytics/data-integration/concepts-data-factory-differences</a:t>
-            </a:r>
-          </a:p>
-          <a:p>
-            <a:endParaRPr lang="en-GB" dirty="0"/>
-          </a:p>
-          <a:p>
-            <a:endParaRPr lang="en-GB" dirty="0"/>
-          </a:p>
-          <a:p>
-            <a:endParaRPr lang="en-GB" dirty="0"/>
+              <a:rPr lang="en-IE" b="1" dirty="0"/>
+              <a:t>Talking Points:</a:t>
+            </a:r>
+          </a:p>
+          <a:p>
+            <a:endParaRPr lang="en-IE" dirty="0"/>
+          </a:p>
+          <a:p>
+            <a:r>
+              <a:rPr lang="en-IE" dirty="0"/>
+              <a:t>Let’s look at how you can ingest data at petabyte-scale using Azure Data Factory or Synapse Pipelines.</a:t>
+            </a:r>
           </a:p>
           <a:p>
             <a:endParaRPr lang="en-GB" dirty="0"/>
@@ -1609,7 +1611,7 @@
           <a:p>
             <a:fld id="{37E24C93-78CA-4AF0-9E77-825D60ABA46D}" type="slidenum">
               <a:rPr lang="en-US" smtClean="0"/>
-              <a:t>6</a:t>
+              <a:t>7</a:t>
             </a:fld>
             <a:endParaRPr lang="en-US"/>
           </a:p>
@@ -1618,7 +1620,7 @@
     </p:spTree>
     <p:extLst>
       <p:ext uri="{BB962C8B-B14F-4D97-AF65-F5344CB8AC3E}">
-        <p14:creationId xmlns:p14="http://schemas.microsoft.com/office/powerpoint/2010/main" val="13529043"/>
+        <p14:creationId xmlns:p14="http://schemas.microsoft.com/office/powerpoint/2010/main" val="2053942289"/>
       </p:ext>
     </p:extLst>
   </p:cSld>
@@ -1672,172 +1674,77 @@
           <a:bodyPr/>
           <a:lstStyle/>
           <a:p>
-            <a:pPr marL="0" marR="0" lvl="0" indent="0" defTabSz="228554" eaLnBrk="1" fontAlgn="auto" latinLnBrk="0" hangingPunct="1">
-              <a:lnSpc>
-                <a:spcPct val="117999"/>
-              </a:lnSpc>
-              <a:spcBef>
-                <a:spcPts val="0"/>
-              </a:spcBef>
-              <a:spcAft>
-                <a:spcPts val="0"/>
-              </a:spcAft>
-              <a:buClrTx/>
-              <a:buSzTx/>
-              <a:buFontTx/>
-              <a:buNone/>
-              <a:tabLst/>
+            <a:r>
+              <a:rPr lang="en-US" sz="1400" b="1" dirty="0"/>
+              <a:t>TALKING POINTS</a:t>
+            </a:r>
+          </a:p>
+          <a:p>
+            <a:pPr>
               <a:defRPr/>
             </a:pPr>
-            <a:r>
-              <a:rPr lang="en-US" sz="1200" b="1" dirty="0"/>
-              <a:t>Talking points</a:t>
-            </a:r>
-          </a:p>
-          <a:p>
-            <a:endParaRPr lang="en-US" sz="1200" b="1" dirty="0"/>
-          </a:p>
-          <a:p>
-            <a:r>
-              <a:rPr lang="en-GB" sz="3200" b="0" i="0" dirty="0">
+            <a:endParaRPr lang="en-US" sz="1400" b="1" dirty="0">
+              <a:latin typeface="Segoe UI"/>
+              <a:cs typeface="Segoe UI"/>
+            </a:endParaRPr>
+          </a:p>
+          <a:p>
+            <a:r>
+              <a:rPr lang="en-GB" b="0" i="0" dirty="0">
                 <a:solidFill>
                   <a:srgbClr val="171717"/>
                 </a:solidFill>
                 <a:effectLst/>
-                <a:latin typeface="Segoe UI" panose="020B0502040204020203" pitchFamily="34" charset="0"/>
+                <a:latin typeface="Segoe UI"/>
+                <a:cs typeface="Segoe UI"/>
               </a:rPr>
-              <a:t>The Copy Data Activity provides a method for building code-free data ingestion pipelines that do not require any transformation during the extraction of the data. The Copy Activity has support for over 100 native connectors. This method can suit new start-up projects that have a simple method of extraction to an intermediary data store. An example of ingesting data using the Copy Activity can include extracting data from multiple source database systems and outputting the data to files in a data lake store. </a:t>
-            </a:r>
-            <a:endParaRPr lang="en-US" sz="1200" b="0" i="0" kern="1200" dirty="0">
+              <a:t>Before looking at petabyte-scale ingestion, lets quickly compare Azure Data Factory with Synapse Pipelines. ADF and Synapse Pipelines are essentially the same product, and they share the same code base. However, there are a few differences you should be aware of, most notably that Synapse Pipelines does not allow the use of the SSIS Integration Runtime.</a:t>
+            </a:r>
+            <a:endParaRPr lang="en-GB" sz="1200" dirty="0">
               <a:solidFill>
-                <a:schemeClr val="tx1"/>
+                <a:srgbClr val="171717"/>
               </a:solidFill>
-              <a:effectLst/>
-              <a:latin typeface="+mn-lt"/>
-              <a:ea typeface="+mn-ea"/>
-              <a:cs typeface="+mn-cs"/>
+              <a:latin typeface="Segoe UI"/>
+              <a:cs typeface="Segoe UI"/>
             </a:endParaRPr>
           </a:p>
           <a:p>
-            <a:endParaRPr lang="en-US" sz="1200" b="0" i="0" kern="1200" dirty="0">
+            <a:endParaRPr lang="en-US" dirty="0">
               <a:solidFill>
-                <a:schemeClr val="tx1"/>
+                <a:srgbClr val="000000"/>
               </a:solidFill>
-              <a:effectLst/>
-              <a:latin typeface="+mn-lt"/>
-              <a:ea typeface="+mn-ea"/>
-              <a:cs typeface="+mn-cs"/>
+              <a:cs typeface="Segoe UI"/>
             </a:endParaRPr>
           </a:p>
           <a:p>
             <a:r>
+              <a:rPr lang="en-US" sz="1200" b="1" dirty="0"/>
+              <a:t>PRESENTER NOTES AND GUIDANCE</a:t>
+            </a:r>
+          </a:p>
+          <a:p>
+            <a:endParaRPr lang="en-US" sz="1200" dirty="0"/>
+          </a:p>
+          <a:p>
+            <a:r>
               <a:rPr lang="en-US" sz="1200" dirty="0"/>
-              <a:t>The Copy activity performs the following steps:</a:t>
-            </a:r>
-          </a:p>
-          <a:p>
-            <a:endParaRPr lang="en-US" sz="1200" dirty="0"/>
-          </a:p>
-          <a:p>
-            <a:pPr marL="228600" indent="-228600">
-              <a:buFont typeface="+mj-lt"/>
-              <a:buAutoNum type="arabicPeriod"/>
-            </a:pPr>
+              <a:t>Review:</a:t>
+            </a:r>
+          </a:p>
+          <a:p>
             <a:r>
               <a:rPr lang="en-US" sz="1200" dirty="0"/>
-              <a:t>Reads data from a source data store.</a:t>
-            </a:r>
-          </a:p>
-          <a:p>
-            <a:pPr marL="228600" indent="-228600">
-              <a:buFont typeface="+mj-lt"/>
-              <a:buAutoNum type="arabicPeriod"/>
-            </a:pPr>
-            <a:r>
-              <a:rPr lang="en-US" sz="1200" dirty="0"/>
-              <a:t>Performs serialization/deserialization, compression/decompression, column mapping, and so on. It performs these operations based on the configuration of the input dataset, output dataset, and Copy activity.</a:t>
-            </a:r>
-          </a:p>
-          <a:p>
-            <a:pPr marL="228600" indent="-228600">
-              <a:buFont typeface="+mj-lt"/>
-              <a:buAutoNum type="arabicPeriod"/>
-            </a:pPr>
-            <a:r>
-              <a:rPr lang="en-US" sz="1200" dirty="0"/>
-              <a:t>Writes data to the sink/destination data store</a:t>
-            </a:r>
-            <a:endParaRPr lang="en-GB" sz="1200" dirty="0"/>
-          </a:p>
-          <a:p>
-            <a:endParaRPr lang="en-US" sz="1200" b="0" i="0" kern="1200" dirty="0">
-              <a:solidFill>
-                <a:schemeClr val="tx1"/>
-              </a:solidFill>
-              <a:effectLst/>
-              <a:latin typeface="+mn-lt"/>
-              <a:ea typeface="+mn-ea"/>
-              <a:cs typeface="+mn-cs"/>
-            </a:endParaRPr>
-          </a:p>
-          <a:p>
-            <a:endParaRPr lang="en-US" sz="1200" dirty="0"/>
-          </a:p>
-          <a:p>
-            <a:r>
-              <a:rPr lang="en-US" sz="1200" b="1" dirty="0"/>
-              <a:t>Instructor notes and guidance.</a:t>
-            </a:r>
-          </a:p>
-          <a:p>
-            <a:endParaRPr lang="en-US" sz="1200" dirty="0"/>
-          </a:p>
-          <a:p>
-            <a:r>
-              <a:rPr lang="en-GB" sz="1200" dirty="0"/>
-              <a:t>You may want to consider running a simple demo of the copy activity yourself to show how to setup the copy activity in Azure Data Factory/Azure Synapse pipelines. Inform the students that they will get to explore the Copy Activity in exercise 2 of the lab.</a:t>
-            </a:r>
-          </a:p>
-          <a:p>
-            <a:endParaRPr lang="en-GB" sz="1200" dirty="0"/>
-          </a:p>
-          <a:p>
-            <a:pPr marL="0" marR="0" lvl="0" indent="0" algn="l" defTabSz="932742" rtl="0" eaLnBrk="1" fontAlgn="auto" latinLnBrk="0" hangingPunct="1">
-              <a:lnSpc>
-                <a:spcPct val="90000"/>
-              </a:lnSpc>
-              <a:spcBef>
-                <a:spcPts val="0"/>
-              </a:spcBef>
-              <a:spcAft>
-                <a:spcPts val="340"/>
-              </a:spcAft>
-              <a:buClrTx/>
-              <a:buSzTx/>
-              <a:buFontTx/>
-              <a:buNone/>
-              <a:tabLst/>
-              <a:defRPr/>
-            </a:pPr>
-            <a:r>
-              <a:rPr lang="en-US" sz="1200" b="1" dirty="0"/>
-              <a:t>Recommended reading for this slide</a:t>
-            </a:r>
-          </a:p>
-          <a:p>
-            <a:endParaRPr lang="en-GB" sz="1200" dirty="0"/>
-          </a:p>
-          <a:p>
-            <a:r>
-              <a:rPr lang="en-GB" sz="3200" dirty="0">
-                <a:hlinkClick r:id="rId3"/>
-              </a:rPr>
-              <a:t>Use data loading best practices in Azure Synapse Analytics - Learn | Microsoft Docs</a:t>
-            </a:r>
-            <a:endParaRPr lang="en-GB" sz="1200" dirty="0"/>
-          </a:p>
-          <a:p>
-            <a:endParaRPr lang="en-GB" sz="1200" dirty="0"/>
+              <a:t>https://docs.microsoft.com/en-us/azure/synapse-analytics/data-integration/concepts-data-factory-differences</a:t>
+            </a:r>
+          </a:p>
+          <a:p>
+            <a:endParaRPr lang="en-GB" dirty="0"/>
+          </a:p>
+          <a:p>
+            <a:endParaRPr lang="en-GB" dirty="0"/>
+          </a:p>
+          <a:p>
+            <a:endParaRPr lang="en-GB" dirty="0"/>
           </a:p>
           <a:p>
             <a:endParaRPr lang="en-GB" dirty="0"/>
@@ -1861,7 +1768,7 @@
           <a:p>
             <a:fld id="{37E24C93-78CA-4AF0-9E77-825D60ABA46D}" type="slidenum">
               <a:rPr lang="en-US" smtClean="0"/>
-              <a:t>7</a:t>
+              <a:t>8</a:t>
             </a:fld>
             <a:endParaRPr lang="en-US"/>
           </a:p>
@@ -1870,7 +1777,7 @@
     </p:spTree>
     <p:extLst>
       <p:ext uri="{BB962C8B-B14F-4D97-AF65-F5344CB8AC3E}">
-        <p14:creationId xmlns:p14="http://schemas.microsoft.com/office/powerpoint/2010/main" val="2806206160"/>
+        <p14:creationId xmlns:p14="http://schemas.microsoft.com/office/powerpoint/2010/main" val="13529043"/>
       </p:ext>
     </p:extLst>
   </p:cSld>
@@ -1924,110 +1831,9 @@
           <a:bodyPr/>
           <a:lstStyle/>
           <a:p>
-            <a:pPr algn="l" rtl="0" fontAlgn="base"/>
-            <a:r>
-              <a:rPr lang="en-US" sz="1200" b="1" i="0" u="none" strike="noStrike" dirty="0">
-                <a:solidFill>
-                  <a:srgbClr val="000000"/>
-                </a:solidFill>
-                <a:effectLst/>
-                <a:latin typeface="Helvetica Neue"/>
-              </a:rPr>
-              <a:t>TALKING POINTS</a:t>
-            </a:r>
-            <a:r>
-              <a:rPr lang="en-US" sz="1200" b="0" i="0" dirty="0">
-                <a:effectLst/>
-                <a:latin typeface="Helvetica Neue"/>
-              </a:rPr>
-              <a:t>​</a:t>
-            </a:r>
-            <a:endParaRPr lang="en-US" b="0" i="0" dirty="0">
-              <a:effectLst/>
-            </a:endParaRPr>
-          </a:p>
-          <a:p>
-            <a:pPr algn="l" rtl="0" fontAlgn="base"/>
-            <a:r>
-              <a:rPr lang="en-US" sz="1200" b="0" i="0" dirty="0">
-                <a:effectLst/>
-                <a:latin typeface="Helvetica Neue"/>
-              </a:rPr>
-              <a:t>​</a:t>
-            </a:r>
-            <a:endParaRPr lang="en-US" b="0" i="0" dirty="0">
-              <a:effectLst/>
-            </a:endParaRPr>
-          </a:p>
-          <a:p>
-            <a:pPr algn="l" rtl="0" fontAlgn="base"/>
-            <a:r>
-              <a:rPr lang="en-US" sz="1200" b="0" i="0" u="none" strike="noStrike" dirty="0">
-                <a:solidFill>
-                  <a:srgbClr val="000000"/>
-                </a:solidFill>
-                <a:effectLst/>
-                <a:latin typeface="Helvetica Neue"/>
-              </a:rPr>
-              <a:t>Let’s put this into reality and show you how it works.</a:t>
-            </a:r>
-            <a:r>
-              <a:rPr lang="en-US" sz="1200" b="0" i="0" dirty="0">
-                <a:effectLst/>
-                <a:latin typeface="Helvetica Neue"/>
-              </a:rPr>
-              <a:t>​</a:t>
-            </a:r>
-            <a:endParaRPr lang="en-US" b="0" i="0" dirty="0">
-              <a:effectLst/>
-            </a:endParaRPr>
-          </a:p>
-          <a:p>
-            <a:pPr algn="l" rtl="0" fontAlgn="base"/>
-            <a:r>
-              <a:rPr lang="en-US" sz="1200" b="0" i="0" dirty="0">
-                <a:effectLst/>
-                <a:latin typeface="Helvetica Neue"/>
-              </a:rPr>
-              <a:t>​</a:t>
-            </a:r>
-            <a:endParaRPr lang="en-US" b="0" i="0" dirty="0">
-              <a:effectLst/>
-            </a:endParaRPr>
-          </a:p>
-          <a:p>
-            <a:pPr>
-              <a:buSzPct val="100000"/>
-            </a:pPr>
-            <a:r>
-              <a:rPr lang="en-GB" sz="1200" spc="0" dirty="0">
-                <a:latin typeface="+mn-lt"/>
-              </a:rPr>
-              <a:t>This lab teaches students how to ingest data into the data warehouse through T-SQL scripts and Synapse Analytics integration pipelines. The student will learn how to load data into Synapse dedicated SQL pools with </a:t>
-            </a:r>
-            <a:r>
-              <a:rPr lang="en-GB" sz="1200" spc="0" dirty="0" err="1">
-                <a:latin typeface="+mn-lt"/>
-              </a:rPr>
-              <a:t>PolyBase</a:t>
-            </a:r>
-            <a:r>
-              <a:rPr lang="en-GB" sz="1200" spc="0" dirty="0">
-                <a:latin typeface="+mn-lt"/>
-              </a:rPr>
-              <a:t> and COPY using T-SQL. The student will also learn how to use workload management along with a Copy activity in a Azure Synapse pipeline for petabyte-scale data ingestion.</a:t>
-            </a:r>
-            <a:endParaRPr lang="en-US" sz="1200" spc="0" dirty="0">
-              <a:latin typeface="+mn-lt"/>
-            </a:endParaRPr>
-          </a:p>
-          <a:p>
-            <a:endParaRPr lang="en-GB" dirty="0"/>
-          </a:p>
-          <a:p>
-            <a:pPr marL="0" marR="0" lvl="0" indent="0" algn="l" defTabSz="914400" rtl="0" eaLnBrk="1" fontAlgn="auto" latinLnBrk="0" hangingPunct="1">
+            <a:pPr marL="0" marR="0" lvl="0" indent="0" defTabSz="228554" eaLnBrk="1" fontAlgn="auto" latinLnBrk="0" hangingPunct="1">
               <a:lnSpc>
-                <a:spcPct val="100000"/>
+                <a:spcPct val="117999"/>
               </a:lnSpc>
               <a:spcBef>
                 <a:spcPts val="0"/>
@@ -2043,17 +1849,154 @@
               <a:defRPr/>
             </a:pPr>
             <a:r>
-              <a:rPr lang="en-US" dirty="0"/>
-              <a:t>In exercise one, you will explore loading data by using Transact-SQL statements, and deliberately compare </a:t>
-            </a:r>
-            <a:r>
-              <a:rPr lang="en-US" dirty="0" err="1"/>
-              <a:t>PolyBase</a:t>
-            </a:r>
-            <a:r>
-              <a:rPr lang="en-US" dirty="0"/>
-              <a:t> and the Copy command so that the student get to see for themselves which method they would like to use. Code is provided in the lab, but you may want to take students who are less familiar with T-SQL through the code, so they understand how it work. Exercise 2 begins by exploring the data loading best practice of working with workload management so that you can manage the priority of a data load. They then move onto the Copy Activity to simplify data ingestion, and deep dive into the settings that are required to set this up successfully.  </a:t>
-            </a:r>
+              <a:rPr lang="en-US" sz="1200" b="1" dirty="0"/>
+              <a:t>Talking points</a:t>
+            </a:r>
+          </a:p>
+          <a:p>
+            <a:endParaRPr lang="en-US" sz="1200" b="1" dirty="0"/>
+          </a:p>
+          <a:p>
+            <a:r>
+              <a:rPr lang="en-GB" sz="3200" b="0" i="0" dirty="0">
+                <a:solidFill>
+                  <a:srgbClr val="171717"/>
+                </a:solidFill>
+                <a:effectLst/>
+                <a:latin typeface="Segoe UI" panose="020B0502040204020203" pitchFamily="34" charset="0"/>
+              </a:rPr>
+              <a:t>The Copy Data Activity provides a method for building code-free data ingestion pipelines that do not require any transformation during the extraction of the data. The Copy Activity has support for over 100 native connectors. This method can suit new start-up projects that have a simple method of extraction to an intermediary data store. An example of ingesting data using the Copy Activity can include extracting data from multiple source database systems and outputting the data to files in a data lake store. </a:t>
+            </a:r>
+            <a:endParaRPr lang="en-US" sz="1200" b="0" i="0" kern="1200" dirty="0">
+              <a:solidFill>
+                <a:schemeClr val="tx1"/>
+              </a:solidFill>
+              <a:effectLst/>
+              <a:latin typeface="+mn-lt"/>
+              <a:ea typeface="+mn-ea"/>
+              <a:cs typeface="+mn-cs"/>
+            </a:endParaRPr>
+          </a:p>
+          <a:p>
+            <a:endParaRPr lang="en-US" sz="1200" b="0" i="0" kern="1200" dirty="0">
+              <a:solidFill>
+                <a:schemeClr val="tx1"/>
+              </a:solidFill>
+              <a:effectLst/>
+              <a:latin typeface="+mn-lt"/>
+              <a:ea typeface="+mn-ea"/>
+              <a:cs typeface="+mn-cs"/>
+            </a:endParaRPr>
+          </a:p>
+          <a:p>
+            <a:r>
+              <a:rPr lang="en-US" sz="1200" dirty="0"/>
+              <a:t>The Copy activity performs the following steps:</a:t>
+            </a:r>
+          </a:p>
+          <a:p>
+            <a:endParaRPr lang="en-US" sz="1200" dirty="0"/>
+          </a:p>
+          <a:p>
+            <a:pPr marL="228600" indent="-228600">
+              <a:buFont typeface="+mj-lt"/>
+              <a:buAutoNum type="arabicPeriod"/>
+            </a:pPr>
+            <a:r>
+              <a:rPr lang="en-US" sz="1200" dirty="0"/>
+              <a:t>Reads data from a source data store.</a:t>
+            </a:r>
+          </a:p>
+          <a:p>
+            <a:pPr marL="228600" indent="-228600">
+              <a:buFont typeface="+mj-lt"/>
+              <a:buAutoNum type="arabicPeriod"/>
+            </a:pPr>
+            <a:r>
+              <a:rPr lang="en-US" sz="1200" dirty="0"/>
+              <a:t>Performs serialization/deserialization, compression/decompression, column mapping, and so on. It performs these operations based on the configuration of the input dataset, output dataset, and Copy activity.</a:t>
+            </a:r>
+          </a:p>
+          <a:p>
+            <a:pPr marL="228600" indent="-228600">
+              <a:buFont typeface="+mj-lt"/>
+              <a:buAutoNum type="arabicPeriod"/>
+            </a:pPr>
+            <a:r>
+              <a:rPr lang="en-US" sz="1200" dirty="0"/>
+              <a:t>Writes data to the sink/destination data store</a:t>
+            </a:r>
+            <a:endParaRPr lang="en-GB" sz="1200" dirty="0"/>
+          </a:p>
+          <a:p>
+            <a:endParaRPr lang="en-US" sz="1200" b="0" i="0" kern="1200" dirty="0">
+              <a:solidFill>
+                <a:schemeClr val="tx1"/>
+              </a:solidFill>
+              <a:effectLst/>
+              <a:latin typeface="+mn-lt"/>
+              <a:ea typeface="+mn-ea"/>
+              <a:cs typeface="+mn-cs"/>
+            </a:endParaRPr>
+          </a:p>
+          <a:p>
+            <a:endParaRPr lang="en-US" sz="1200" dirty="0"/>
+          </a:p>
+          <a:p>
+            <a:r>
+              <a:rPr lang="en-US" sz="1200" b="1" dirty="0"/>
+              <a:t>Instructor notes and guidance.</a:t>
+            </a:r>
+          </a:p>
+          <a:p>
+            <a:endParaRPr lang="en-US" sz="1200" dirty="0"/>
+          </a:p>
+          <a:p>
+            <a:r>
+              <a:rPr lang="en-GB" sz="1200" dirty="0"/>
+              <a:t>You may want to consider running a simple demo of the copy activity yourself to show how to setup the copy activity in Azure Data Factory/Azure Synapse pipelines. Inform the students that they will get to explore the Copy Activity in exercise 2 of the lab.</a:t>
+            </a:r>
+          </a:p>
+          <a:p>
+            <a:endParaRPr lang="en-GB" sz="1200" dirty="0"/>
+          </a:p>
+          <a:p>
+            <a:pPr marL="0" marR="0" lvl="0" indent="0" algn="l" defTabSz="932742" rtl="0" eaLnBrk="1" fontAlgn="auto" latinLnBrk="0" hangingPunct="1">
+              <a:lnSpc>
+                <a:spcPct val="90000"/>
+              </a:lnSpc>
+              <a:spcBef>
+                <a:spcPts val="0"/>
+              </a:spcBef>
+              <a:spcAft>
+                <a:spcPts val="340"/>
+              </a:spcAft>
+              <a:buClrTx/>
+              <a:buSzTx/>
+              <a:buFontTx/>
+              <a:buNone/>
+              <a:tabLst/>
+              <a:defRPr/>
+            </a:pPr>
+            <a:r>
+              <a:rPr lang="en-US" sz="1200" b="1" dirty="0"/>
+              <a:t>Recommended reading for this slide</a:t>
+            </a:r>
+          </a:p>
+          <a:p>
+            <a:endParaRPr lang="en-GB" sz="1200" dirty="0"/>
+          </a:p>
+          <a:p>
+            <a:r>
+              <a:rPr lang="en-GB" sz="3200" dirty="0">
+                <a:hlinkClick r:id="rId3"/>
+              </a:rPr>
+              <a:t>Use data loading best practices in Azure Synapse Analytics - Learn | Microsoft Docs</a:t>
+            </a:r>
+            <a:endParaRPr lang="en-GB" sz="1200" dirty="0"/>
+          </a:p>
+          <a:p>
+            <a:endParaRPr lang="en-GB" sz="1200" dirty="0"/>
           </a:p>
           <a:p>
             <a:endParaRPr lang="en-GB" dirty="0"/>
@@ -2077,7 +2020,7 @@
           <a:p>
             <a:fld id="{37E24C93-78CA-4AF0-9E77-825D60ABA46D}" type="slidenum">
               <a:rPr lang="en-US" smtClean="0"/>
-              <a:t>8</a:t>
+              <a:t>9</a:t>
             </a:fld>
             <a:endParaRPr lang="en-US"/>
           </a:p>
@@ -2086,7 +2029,7 @@
     </p:spTree>
     <p:extLst>
       <p:ext uri="{BB962C8B-B14F-4D97-AF65-F5344CB8AC3E}">
-        <p14:creationId xmlns:p14="http://schemas.microsoft.com/office/powerpoint/2010/main" val="1674645597"/>
+        <p14:creationId xmlns:p14="http://schemas.microsoft.com/office/powerpoint/2010/main" val="2806206160"/>
       </p:ext>
     </p:extLst>
   </p:cSld>
@@ -2185,6 +2128,222 @@
                 <a:effectLst/>
                 <a:latin typeface="Helvetica Neue"/>
               </a:rPr>
+              <a:t>Let’s put this into reality and show you how it works.</a:t>
+            </a:r>
+            <a:r>
+              <a:rPr lang="en-US" sz="1200" b="0" i="0" dirty="0">
+                <a:effectLst/>
+                <a:latin typeface="Helvetica Neue"/>
+              </a:rPr>
+              <a:t>​</a:t>
+            </a:r>
+            <a:endParaRPr lang="en-US" b="0" i="0" dirty="0">
+              <a:effectLst/>
+            </a:endParaRPr>
+          </a:p>
+          <a:p>
+            <a:pPr algn="l" rtl="0" fontAlgn="base"/>
+            <a:r>
+              <a:rPr lang="en-US" sz="1200" b="0" i="0" dirty="0">
+                <a:effectLst/>
+                <a:latin typeface="Helvetica Neue"/>
+              </a:rPr>
+              <a:t>​</a:t>
+            </a:r>
+            <a:endParaRPr lang="en-US" b="0" i="0" dirty="0">
+              <a:effectLst/>
+            </a:endParaRPr>
+          </a:p>
+          <a:p>
+            <a:pPr>
+              <a:buSzPct val="100000"/>
+            </a:pPr>
+            <a:r>
+              <a:rPr lang="en-GB" sz="1200" spc="0" dirty="0">
+                <a:latin typeface="+mn-lt"/>
+              </a:rPr>
+              <a:t>This lab teaches students how to ingest data into the data warehouse through T-SQL scripts and Synapse Analytics integration pipelines. The student will learn how to load data into Synapse dedicated SQL pools with </a:t>
+            </a:r>
+            <a:r>
+              <a:rPr lang="en-GB" sz="1200" spc="0" dirty="0" err="1">
+                <a:latin typeface="+mn-lt"/>
+              </a:rPr>
+              <a:t>PolyBase</a:t>
+            </a:r>
+            <a:r>
+              <a:rPr lang="en-GB" sz="1200" spc="0" dirty="0">
+                <a:latin typeface="+mn-lt"/>
+              </a:rPr>
+              <a:t> and COPY using T-SQL. The student will also learn how to use workload management along with a Copy activity in a Azure Synapse pipeline for petabyte-scale data ingestion.</a:t>
+            </a:r>
+            <a:endParaRPr lang="en-US" sz="1200" spc="0" dirty="0">
+              <a:latin typeface="+mn-lt"/>
+            </a:endParaRPr>
+          </a:p>
+          <a:p>
+            <a:endParaRPr lang="en-GB" dirty="0"/>
+          </a:p>
+          <a:p>
+            <a:pPr marL="0" marR="0" lvl="0" indent="0" algn="l" defTabSz="914400" rtl="0" eaLnBrk="1" fontAlgn="auto" latinLnBrk="0" hangingPunct="1">
+              <a:lnSpc>
+                <a:spcPct val="100000"/>
+              </a:lnSpc>
+              <a:spcBef>
+                <a:spcPts val="0"/>
+              </a:spcBef>
+              <a:spcAft>
+                <a:spcPts val="0"/>
+              </a:spcAft>
+              <a:buClrTx/>
+              <a:buSzTx/>
+              <a:buFontTx/>
+              <a:buNone/>
+              <a:tabLst/>
+              <a:defRPr/>
+            </a:pPr>
+            <a:r>
+              <a:rPr lang="en-US" dirty="0"/>
+              <a:t>In exercise one, you will explore loading data by using Transact-SQL statements, and deliberately compare </a:t>
+            </a:r>
+            <a:r>
+              <a:rPr lang="en-US" dirty="0" err="1"/>
+              <a:t>PolyBase</a:t>
+            </a:r>
+            <a:r>
+              <a:rPr lang="en-US" dirty="0"/>
+              <a:t> and the Copy command so that the student get to see for themselves which method they would like to use. Code is provided in the lab, but you may want to take students who are less familiar with T-SQL through the code, so they understand how it work. Exercise 2 begins by exploring the data loading best practice of working with workload management so that you can manage the priority of a data load. They then move onto the Copy Activity to simplify data ingestion, and deep dive into the settings that are required to set this up successfully.  </a:t>
+            </a:r>
+          </a:p>
+          <a:p>
+            <a:endParaRPr lang="en-GB" dirty="0"/>
+          </a:p>
+        </p:txBody>
+      </p:sp>
+      <p:sp>
+        <p:nvSpPr>
+          <p:cNvPr id="4" name="Slide Number Placeholder 3"/>
+          <p:cNvSpPr>
+            <a:spLocks noGrp="1"/>
+          </p:cNvSpPr>
+          <p:nvPr>
+            <p:ph type="sldNum" sz="quarter" idx="5"/>
+          </p:nvPr>
+        </p:nvSpPr>
+        <p:spPr/>
+        <p:txBody>
+          <a:bodyPr/>
+          <a:lstStyle/>
+          <a:p>
+            <a:fld id="{37E24C93-78CA-4AF0-9E77-825D60ABA46D}" type="slidenum">
+              <a:rPr lang="en-US" smtClean="0"/>
+              <a:t>10</a:t>
+            </a:fld>
+            <a:endParaRPr lang="en-US"/>
+          </a:p>
+        </p:txBody>
+      </p:sp>
+    </p:spTree>
+    <p:extLst>
+      <p:ext uri="{BB962C8B-B14F-4D97-AF65-F5344CB8AC3E}">
+        <p14:creationId xmlns:p14="http://schemas.microsoft.com/office/powerpoint/2010/main" val="1674645597"/>
+      </p:ext>
+    </p:extLst>
+  </p:cSld>
+  <p:clrMapOvr>
+    <a:masterClrMapping/>
+  </p:clrMapOvr>
+</p:notes>
+</file>
+
+<file path=ppt/notesSlides/notesSlide9.xml><?xml version="1.0" encoding="utf-8"?>
+<p:notes xmlns:a="http://schemas.openxmlformats.org/drawingml/2006/main" xmlns:r="http://schemas.openxmlformats.org/officeDocument/2006/relationships" xmlns:p="http://schemas.openxmlformats.org/presentationml/2006/main">
+  <p:cSld>
+    <p:spTree>
+      <p:nvGrpSpPr>
+        <p:cNvPr id="1" name=""/>
+        <p:cNvGrpSpPr/>
+        <p:nvPr/>
+      </p:nvGrpSpPr>
+      <p:grpSpPr>
+        <a:xfrm>
+          <a:off x="0" y="0"/>
+          <a:ext cx="0" cy="0"/>
+          <a:chOff x="0" y="0"/>
+          <a:chExt cx="0" cy="0"/>
+        </a:xfrm>
+      </p:grpSpPr>
+      <p:sp>
+        <p:nvSpPr>
+          <p:cNvPr id="2" name="Slide Image Placeholder 1"/>
+          <p:cNvSpPr>
+            <a:spLocks noGrp="1" noRot="1" noChangeAspect="1"/>
+          </p:cNvSpPr>
+          <p:nvPr>
+            <p:ph type="sldImg"/>
+          </p:nvPr>
+        </p:nvSpPr>
+        <p:spPr/>
+      </p:sp>
+      <p:sp>
+        <p:nvSpPr>
+          <p:cNvPr id="3" name="Notes Placeholder 2"/>
+          <p:cNvSpPr>
+            <a:spLocks noGrp="1"/>
+          </p:cNvSpPr>
+          <p:nvPr>
+            <p:ph type="body" idx="1"/>
+          </p:nvPr>
+        </p:nvSpPr>
+        <p:spPr/>
+        <p:txBody>
+          <a:bodyPr/>
+          <a:lstStyle/>
+          <a:p>
+            <a:pPr algn="l" rtl="0" fontAlgn="base"/>
+            <a:r>
+              <a:rPr lang="en-US" sz="1200" b="1" i="0" u="none" strike="noStrike" dirty="0">
+                <a:solidFill>
+                  <a:srgbClr val="000000"/>
+                </a:solidFill>
+                <a:effectLst/>
+                <a:latin typeface="Helvetica Neue"/>
+              </a:rPr>
+              <a:t>TALKING POINTS</a:t>
+            </a:r>
+            <a:r>
+              <a:rPr lang="en-US" sz="1200" b="0" i="0" dirty="0">
+                <a:effectLst/>
+                <a:latin typeface="Helvetica Neue"/>
+              </a:rPr>
+              <a:t>​</a:t>
+            </a:r>
+            <a:endParaRPr lang="en-US" b="0" i="0" dirty="0">
+              <a:effectLst/>
+            </a:endParaRPr>
+          </a:p>
+          <a:p>
+            <a:pPr algn="l" rtl="0" fontAlgn="base"/>
+            <a:r>
+              <a:rPr lang="en-US" sz="1200" b="0" i="0" dirty="0">
+                <a:effectLst/>
+                <a:latin typeface="Helvetica Neue"/>
+              </a:rPr>
+              <a:t>​</a:t>
+            </a:r>
+            <a:endParaRPr lang="en-US" b="0" i="0" dirty="0">
+              <a:effectLst/>
+            </a:endParaRPr>
+          </a:p>
+          <a:p>
+            <a:pPr algn="l" rtl="0" fontAlgn="base"/>
+            <a:r>
+              <a:rPr lang="en-US" sz="1200" b="0" i="0" u="none" strike="noStrike" dirty="0">
+                <a:solidFill>
+                  <a:srgbClr val="000000"/>
+                </a:solidFill>
+                <a:effectLst/>
+                <a:latin typeface="Helvetica Neue"/>
+              </a:rPr>
               <a:t>This slide links to our content on Microsoft Learn</a:t>
             </a:r>
             <a:endParaRPr lang="en-US" b="0" i="0" dirty="0">
@@ -2370,7 +2529,7 @@
                 <a:tabLst/>
                 <a:defRPr/>
               </a:pPr>
-              <a:t>11/27/2021 1:23 PM</a:t>
+              <a:t>11/28/2021 9:32 AM</a:t>
             </a:fld>
             <a:endParaRPr kumimoji="0" lang="en-US" sz="5599" b="0" i="0" u="none" strike="noStrike" kern="0" cap="none" spc="-112" normalizeH="0" baseline="0" noProof="0" dirty="0">
               <a:ln>
@@ -2453,7 +2612,7 @@
                 <a:tabLst/>
                 <a:defRPr/>
               </a:pPr>
-              <a:t>9</a:t>
+              <a:t>11</a:t>
             </a:fld>
             <a:endParaRPr kumimoji="0" lang="en-US" sz="5599" b="0" i="0" u="none" strike="noStrike" kern="0" cap="none" spc="-112" normalizeH="0" baseline="0" noProof="0" dirty="0">
               <a:ln>
@@ -42309,6 +42468,177 @@
 </p:sld>
 </file>
 
+<file path=ppt/slides/slide10.xml><?xml version="1.0" encoding="utf-8"?>
+<p:sld xmlns:a="http://schemas.openxmlformats.org/drawingml/2006/main" xmlns:r="http://schemas.openxmlformats.org/officeDocument/2006/relationships" xmlns:p="http://schemas.openxmlformats.org/presentationml/2006/main">
+  <p:cSld>
+    <p:spTree>
+      <p:nvGrpSpPr>
+        <p:cNvPr id="1" name=""/>
+        <p:cNvGrpSpPr/>
+        <p:nvPr/>
+      </p:nvGrpSpPr>
+      <p:grpSpPr>
+        <a:xfrm>
+          <a:off x="0" y="0"/>
+          <a:ext cx="0" cy="0"/>
+          <a:chOff x="0" y="0"/>
+          <a:chExt cx="0" cy="0"/>
+        </a:xfrm>
+      </p:grpSpPr>
+      <p:sp>
+        <p:nvSpPr>
+          <p:cNvPr id="2" name="Title 1">
+            <a:extLst>
+              <a:ext uri="{FF2B5EF4-FFF2-40B4-BE49-F238E27FC236}">
+                <a16:creationId xmlns:a16="http://schemas.microsoft.com/office/drawing/2014/main" id="{21A99087-F939-4EAF-AD38-211701C7799F}"/>
+              </a:ext>
+            </a:extLst>
+          </p:cNvPr>
+          <p:cNvSpPr>
+            <a:spLocks noGrp="1"/>
+          </p:cNvSpPr>
+          <p:nvPr>
+            <p:ph type="ctrTitle"/>
+          </p:nvPr>
+        </p:nvSpPr>
+        <p:spPr>
+          <a:xfrm>
+            <a:off x="1387813" y="3415452"/>
+            <a:ext cx="9144000" cy="1096613"/>
+          </a:xfrm>
+        </p:spPr>
+        <p:txBody>
+          <a:bodyPr>
+            <a:normAutofit fontScale="90000"/>
+          </a:bodyPr>
+          <a:lstStyle/>
+          <a:p>
+            <a:r>
+              <a:rPr lang="en-US" dirty="0"/>
+              <a:t>LAB: Ingest and load data into the data warehouse</a:t>
+            </a:r>
+          </a:p>
+        </p:txBody>
+      </p:sp>
+      <p:sp>
+        <p:nvSpPr>
+          <p:cNvPr id="3" name="Subtitle 2">
+            <a:extLst>
+              <a:ext uri="{FF2B5EF4-FFF2-40B4-BE49-F238E27FC236}">
+                <a16:creationId xmlns:a16="http://schemas.microsoft.com/office/drawing/2014/main" id="{78BC2C14-5B54-4319-BA1D-46B0C6B5B674}"/>
+              </a:ext>
+            </a:extLst>
+          </p:cNvPr>
+          <p:cNvSpPr>
+            <a:spLocks noGrp="1"/>
+          </p:cNvSpPr>
+          <p:nvPr>
+            <p:ph type="subTitle" idx="1"/>
+          </p:nvPr>
+        </p:nvSpPr>
+        <p:spPr>
+          <a:xfrm>
+            <a:off x="1387813" y="4843830"/>
+            <a:ext cx="9144000" cy="531554"/>
+          </a:xfrm>
+        </p:spPr>
+        <p:txBody>
+          <a:bodyPr/>
+          <a:lstStyle/>
+          <a:p>
+            <a:r>
+              <a:rPr lang="en-US" dirty="0"/>
+              <a:t>60 minutes</a:t>
+            </a:r>
+          </a:p>
+        </p:txBody>
+      </p:sp>
+    </p:spTree>
+    <p:extLst>
+      <p:ext uri="{BB962C8B-B14F-4D97-AF65-F5344CB8AC3E}">
+        <p14:creationId xmlns:p14="http://schemas.microsoft.com/office/powerpoint/2010/main" val="86463890"/>
+      </p:ext>
+    </p:extLst>
+  </p:cSld>
+  <p:clrMapOvr>
+    <a:masterClrMapping/>
+  </p:clrMapOvr>
+</p:sld>
+</file>
+
+<file path=ppt/slides/slide11.xml><?xml version="1.0" encoding="utf-8"?>
+<p:sld xmlns:a="http://schemas.openxmlformats.org/drawingml/2006/main" xmlns:r="http://schemas.openxmlformats.org/officeDocument/2006/relationships" xmlns:p="http://schemas.openxmlformats.org/presentationml/2006/main">
+  <p:cSld>
+    <p:spTree>
+      <p:nvGrpSpPr>
+        <p:cNvPr id="1" name=""/>
+        <p:cNvGrpSpPr/>
+        <p:nvPr/>
+      </p:nvGrpSpPr>
+      <p:grpSpPr>
+        <a:xfrm>
+          <a:off x="0" y="0"/>
+          <a:ext cx="0" cy="0"/>
+          <a:chOff x="0" y="0"/>
+          <a:chExt cx="0" cy="0"/>
+        </a:xfrm>
+      </p:grpSpPr>
+      <p:sp>
+        <p:nvSpPr>
+          <p:cNvPr id="5" name="Text Placeholder 4">
+            <a:extLst>
+              <a:ext uri="{FF2B5EF4-FFF2-40B4-BE49-F238E27FC236}">
+                <a16:creationId xmlns:a16="http://schemas.microsoft.com/office/drawing/2014/main" id="{EC99176B-B077-CD47-B52F-31E096175EF2}"/>
+              </a:ext>
+            </a:extLst>
+          </p:cNvPr>
+          <p:cNvSpPr>
+            <a:spLocks noGrp="1"/>
+          </p:cNvSpPr>
+          <p:nvPr>
+            <p:ph type="body" sz="quarter" idx="12"/>
+          </p:nvPr>
+        </p:nvSpPr>
+        <p:spPr>
+          <a:xfrm>
+            <a:off x="352927" y="6311900"/>
+            <a:ext cx="10784973" cy="204353"/>
+          </a:xfrm>
+        </p:spPr>
+        <p:txBody>
+          <a:bodyPr/>
+          <a:lstStyle/>
+          <a:p>
+            <a:r>
+              <a:rPr lang="en-GB" dirty="0">
+                <a:hlinkClick r:id="rId3"/>
+              </a:rPr>
+              <a:t>Build data analytics solutions using Azure Synapse serverless SQL pools - Learn | Microsoft Docs</a:t>
+            </a:r>
+            <a:endParaRPr lang="en-US" dirty="0">
+              <a:solidFill>
+                <a:srgbClr val="0478D4"/>
+              </a:solidFill>
+            </a:endParaRPr>
+          </a:p>
+        </p:txBody>
+      </p:sp>
+    </p:spTree>
+    <p:extLst>
+      <p:ext uri="{BB962C8B-B14F-4D97-AF65-F5344CB8AC3E}">
+        <p14:creationId xmlns:p14="http://schemas.microsoft.com/office/powerpoint/2010/main" val="3747424516"/>
+      </p:ext>
+    </p:extLst>
+  </p:cSld>
+  <p:clrMapOvr>
+    <a:masterClrMapping/>
+  </p:clrMapOvr>
+  <p:transition>
+    <p:fade/>
+  </p:transition>
+</p:sld>
+</file>
+
 <file path=ppt/slides/slide2.xml><?xml version="1.0" encoding="utf-8"?>
 <p:sld xmlns:a="http://schemas.openxmlformats.org/drawingml/2006/main" xmlns:r="http://schemas.openxmlformats.org/officeDocument/2006/relationships" xmlns:p="http://schemas.openxmlformats.org/presentationml/2006/main">
   <p:cSld>
@@ -42479,6 +42809,331 @@
       </p:grpSpPr>
       <p:sp>
         <p:nvSpPr>
+          <p:cNvPr id="2" name="Title 1">
+            <a:extLst>
+              <a:ext uri="{FF2B5EF4-FFF2-40B4-BE49-F238E27FC236}">
+                <a16:creationId xmlns:a16="http://schemas.microsoft.com/office/drawing/2014/main" id="{2669A492-1D24-48FF-82D7-A1B722C1CE8B}"/>
+              </a:ext>
+            </a:extLst>
+          </p:cNvPr>
+          <p:cNvSpPr>
+            <a:spLocks noGrp="1"/>
+          </p:cNvSpPr>
+          <p:nvPr>
+            <p:ph type="title"/>
+          </p:nvPr>
+        </p:nvSpPr>
+        <p:spPr/>
+        <p:txBody>
+          <a:bodyPr/>
+          <a:lstStyle/>
+          <a:p>
+            <a:r>
+              <a:rPr lang="en-US" dirty="0"/>
+              <a:t>TODOs</a:t>
+            </a:r>
+          </a:p>
+        </p:txBody>
+      </p:sp>
+      <p:sp>
+        <p:nvSpPr>
+          <p:cNvPr id="3" name="Footer Placeholder 2">
+            <a:extLst>
+              <a:ext uri="{FF2B5EF4-FFF2-40B4-BE49-F238E27FC236}">
+                <a16:creationId xmlns:a16="http://schemas.microsoft.com/office/drawing/2014/main" id="{38A0317D-791E-44AE-B1ED-DF63A30BE7E7}"/>
+              </a:ext>
+            </a:extLst>
+          </p:cNvPr>
+          <p:cNvSpPr>
+            <a:spLocks noGrp="1"/>
+          </p:cNvSpPr>
+          <p:nvPr>
+            <p:ph type="ftr" sz="quarter" idx="3"/>
+          </p:nvPr>
+        </p:nvSpPr>
+        <p:spPr/>
+        <p:txBody>
+          <a:bodyPr/>
+          <a:lstStyle/>
+          <a:p>
+            <a:r>
+              <a:rPr lang="en-US"/>
+              <a:t>WWW.SOLLIANCE.NET</a:t>
+            </a:r>
+            <a:endParaRPr lang="en-US" dirty="0"/>
+          </a:p>
+        </p:txBody>
+      </p:sp>
+      <p:sp>
+        <p:nvSpPr>
+          <p:cNvPr id="4" name="Slide Number Placeholder 3">
+            <a:extLst>
+              <a:ext uri="{FF2B5EF4-FFF2-40B4-BE49-F238E27FC236}">
+                <a16:creationId xmlns:a16="http://schemas.microsoft.com/office/drawing/2014/main" id="{9E148F3A-F0B5-4103-9494-3504861FF1C6}"/>
+              </a:ext>
+            </a:extLst>
+          </p:cNvPr>
+          <p:cNvSpPr>
+            <a:spLocks noGrp="1"/>
+          </p:cNvSpPr>
+          <p:nvPr>
+            <p:ph type="sldNum" sz="quarter" idx="4"/>
+          </p:nvPr>
+        </p:nvSpPr>
+        <p:spPr/>
+        <p:txBody>
+          <a:bodyPr/>
+          <a:lstStyle/>
+          <a:p>
+            <a:fld id="{00F9DAA1-1DF7-43E0-8E29-0CE1148553C7}" type="slidenum">
+              <a:rPr lang="en-US" smtClean="0"/>
+              <a:pPr/>
+              <a:t>3</a:t>
+            </a:fld>
+            <a:endParaRPr lang="en-US" dirty="0"/>
+          </a:p>
+        </p:txBody>
+      </p:sp>
+      <p:sp>
+        <p:nvSpPr>
+          <p:cNvPr id="5" name="Text Placeholder 4">
+            <a:extLst>
+              <a:ext uri="{FF2B5EF4-FFF2-40B4-BE49-F238E27FC236}">
+                <a16:creationId xmlns:a16="http://schemas.microsoft.com/office/drawing/2014/main" id="{FEC2E5B0-2B76-4E81-A823-793AA2BD53AB}"/>
+              </a:ext>
+            </a:extLst>
+          </p:cNvPr>
+          <p:cNvSpPr>
+            <a:spLocks noGrp="1"/>
+          </p:cNvSpPr>
+          <p:nvPr>
+            <p:ph type="body" sz="quarter" idx="10"/>
+          </p:nvPr>
+        </p:nvSpPr>
+        <p:spPr/>
+        <p:txBody>
+          <a:bodyPr>
+            <a:normAutofit fontScale="92500" lnSpcReduction="20000"/>
+          </a:bodyPr>
+          <a:lstStyle/>
+          <a:p>
+            <a:r>
+              <a:rPr lang="en-US" dirty="0"/>
+              <a:t>Indexes</a:t>
+            </a:r>
+          </a:p>
+          <a:p>
+            <a:pPr lvl="1"/>
+            <a:r>
+              <a:rPr lang="en-US" dirty="0"/>
+              <a:t>Heaps &amp; when to use (</a:t>
+            </a:r>
+            <a:r>
+              <a:rPr lang="en-US" dirty="0">
+                <a:hlinkClick r:id="rId2"/>
+              </a:rPr>
+              <a:t>https://docs.microsoft.com/en-us/sql/relational-databases/indexes/heaps-tables-without-clustered-indexes?view=sql-server-ver15</a:t>
+            </a:r>
+            <a:r>
+              <a:rPr lang="en-US" dirty="0"/>
+              <a:t>)</a:t>
+            </a:r>
+          </a:p>
+          <a:p>
+            <a:pPr lvl="1"/>
+            <a:r>
+              <a:rPr lang="en-US" dirty="0"/>
+              <a:t>Clustered &amp; </a:t>
+            </a:r>
+            <a:r>
+              <a:rPr lang="en-US" dirty="0" err="1"/>
+              <a:t>Nonclustered</a:t>
+            </a:r>
+            <a:r>
+              <a:rPr lang="en-US" dirty="0"/>
+              <a:t> indexes (</a:t>
+            </a:r>
+            <a:r>
+              <a:rPr lang="en-US" dirty="0">
+                <a:hlinkClick r:id="rId3"/>
+              </a:rPr>
+              <a:t>https://docs.microsoft.com/en-us/sql/relational-databases/indexes/clustered-and-nonclustered-indexes-described?view=sql-server-ver15</a:t>
+            </a:r>
+            <a:r>
+              <a:rPr lang="en-US" dirty="0"/>
+              <a:t>)</a:t>
+            </a:r>
+          </a:p>
+          <a:p>
+            <a:pPr lvl="1"/>
+            <a:r>
+              <a:rPr lang="en-US" dirty="0"/>
+              <a:t>Columnstore indexes (</a:t>
+            </a:r>
+            <a:r>
+              <a:rPr lang="en-US" dirty="0">
+                <a:hlinkClick r:id="rId4"/>
+              </a:rPr>
+              <a:t>https://docs.microsoft.com/en-us/sql/relational-databases/indexes/columnstore-indexes-overview?view=sql-server-ver15</a:t>
+            </a:r>
+            <a:r>
+              <a:rPr lang="en-US" dirty="0"/>
+              <a:t>)</a:t>
+            </a:r>
+          </a:p>
+          <a:p>
+            <a:r>
+              <a:rPr lang="en-US" dirty="0"/>
+              <a:t>Workload management </a:t>
+            </a:r>
+            <a:r>
+              <a:rPr lang="en-US"/>
+              <a:t>in Synapse</a:t>
+            </a:r>
+            <a:r>
+              <a:rPr lang="en-US" dirty="0"/>
+              <a:t>?</a:t>
+            </a:r>
+          </a:p>
+          <a:p>
+            <a:r>
+              <a:rPr lang="en-US" dirty="0" err="1"/>
+              <a:t>PolyBase</a:t>
+            </a:r>
+            <a:r>
+              <a:rPr lang="en-US" dirty="0"/>
+              <a:t> (</a:t>
+            </a:r>
+            <a:r>
+              <a:rPr lang="en-US" dirty="0">
+                <a:hlinkClick r:id="rId5"/>
+              </a:rPr>
+              <a:t>https://docs.microsoft.com/en-us/sql/relational-databases/polybase/polybase-guide?view=azure-sqldw-latest</a:t>
+            </a:r>
+            <a:r>
+              <a:rPr lang="en-US" dirty="0"/>
+              <a:t>)</a:t>
+            </a:r>
+          </a:p>
+          <a:p>
+            <a:r>
+              <a:rPr lang="en-US" dirty="0"/>
+              <a:t>Copy statement (</a:t>
+            </a:r>
+            <a:r>
+              <a:rPr lang="en-US" dirty="0">
+                <a:hlinkClick r:id="rId6"/>
+              </a:rPr>
+              <a:t>https://docs.microsoft.com/en-us/sql/t-sql/statements/copy-into-transact-sql?view=azure-sqldw-latest</a:t>
+            </a:r>
+            <a:r>
+              <a:rPr lang="en-US" dirty="0"/>
+              <a:t>)</a:t>
+            </a:r>
+          </a:p>
+          <a:p>
+            <a:r>
+              <a:rPr lang="en-US" dirty="0"/>
+              <a:t>Differences between </a:t>
+            </a:r>
+            <a:r>
+              <a:rPr lang="en-US" dirty="0" err="1"/>
+              <a:t>PolyBase</a:t>
+            </a:r>
+            <a:r>
+              <a:rPr lang="en-US" dirty="0"/>
+              <a:t> and COPY, and when to use each</a:t>
+            </a:r>
+          </a:p>
+          <a:p>
+            <a:r>
+              <a:rPr lang="en-US" dirty="0"/>
+              <a:t>Intro to ADF/Synapse Pipelines</a:t>
+            </a:r>
+          </a:p>
+          <a:p>
+            <a:pPr lvl="1"/>
+            <a:r>
+              <a:rPr lang="en-US" dirty="0"/>
+              <a:t>What is it</a:t>
+            </a:r>
+          </a:p>
+          <a:p>
+            <a:pPr lvl="1"/>
+            <a:r>
+              <a:rPr lang="en-US" dirty="0"/>
+              <a:t>When to use</a:t>
+            </a:r>
+          </a:p>
+          <a:p>
+            <a:pPr lvl="1"/>
+            <a:r>
+              <a:rPr lang="en-US" dirty="0"/>
+              <a:t>ETL vs ELT</a:t>
+            </a:r>
+          </a:p>
+        </p:txBody>
+      </p:sp>
+      <p:sp>
+        <p:nvSpPr>
+          <p:cNvPr id="6" name="Text Placeholder 5">
+            <a:extLst>
+              <a:ext uri="{FF2B5EF4-FFF2-40B4-BE49-F238E27FC236}">
+                <a16:creationId xmlns:a16="http://schemas.microsoft.com/office/drawing/2014/main" id="{C61737B0-64F8-43C5-B7E8-EC67AE63192D}"/>
+              </a:ext>
+            </a:extLst>
+          </p:cNvPr>
+          <p:cNvSpPr>
+            <a:spLocks noGrp="1"/>
+          </p:cNvSpPr>
+          <p:nvPr>
+            <p:ph type="body" sz="quarter" idx="16"/>
+          </p:nvPr>
+        </p:nvSpPr>
+        <p:spPr/>
+        <p:txBody>
+          <a:bodyPr/>
+          <a:lstStyle/>
+          <a:p>
+            <a:r>
+              <a:rPr lang="en-US" dirty="0"/>
+              <a:t>Slides to add to this deck</a:t>
+            </a:r>
+          </a:p>
+        </p:txBody>
+      </p:sp>
+    </p:spTree>
+    <p:extLst>
+      <p:ext uri="{BB962C8B-B14F-4D97-AF65-F5344CB8AC3E}">
+        <p14:creationId xmlns:p14="http://schemas.microsoft.com/office/powerpoint/2010/main" val="2643974189"/>
+      </p:ext>
+    </p:extLst>
+  </p:cSld>
+  <p:clrMapOvr>
+    <a:masterClrMapping/>
+  </p:clrMapOvr>
+</p:sld>
+</file>
+
+<file path=ppt/slides/slide4.xml><?xml version="1.0" encoding="utf-8"?>
+<p:sld xmlns:a="http://schemas.openxmlformats.org/drawingml/2006/main" xmlns:r="http://schemas.openxmlformats.org/officeDocument/2006/relationships" xmlns:p="http://schemas.openxmlformats.org/presentationml/2006/main">
+  <p:cSld>
+    <p:spTree>
+      <p:nvGrpSpPr>
+        <p:cNvPr id="1" name=""/>
+        <p:cNvGrpSpPr/>
+        <p:nvPr/>
+      </p:nvGrpSpPr>
+      <p:grpSpPr>
+        <a:xfrm>
+          <a:off x="0" y="0"/>
+          <a:ext cx="0" cy="0"/>
+          <a:chOff x="0" y="0"/>
+          <a:chExt cx="0" cy="0"/>
+        </a:xfrm>
+      </p:grpSpPr>
+      <p:sp>
+        <p:nvSpPr>
           <p:cNvPr id="9" name="Text Placeholder 8">
             <a:extLst>
               <a:ext uri="{FF2B5EF4-FFF2-40B4-BE49-F238E27FC236}">
@@ -42592,7 +43247,7 @@
 </p:sld>
 </file>
 
-<file path=ppt/slides/slide4.xml><?xml version="1.0" encoding="utf-8"?>
+<file path=ppt/slides/slide5.xml><?xml version="1.0" encoding="utf-8"?>
 <p:sld xmlns:a="http://schemas.openxmlformats.org/drawingml/2006/main" xmlns:r="http://schemas.openxmlformats.org/officeDocument/2006/relationships" xmlns:p="http://schemas.openxmlformats.org/presentationml/2006/main">
   <p:cSld>
     <p:spTree>
@@ -42789,7 +43444,7 @@
                 <a:tabLst/>
                 <a:defRPr/>
               </a:pPr>
-              <a:t>4</a:t>
+              <a:t>5</a:t>
             </a:fld>
             <a:endParaRPr kumimoji="0" lang="en-US" sz="900" b="1" i="0" u="none" strike="noStrike" kern="1200" cap="none" spc="0" normalizeH="0" baseline="0" noProof="0">
               <a:ln>
@@ -42879,7 +43534,7 @@
             </a:r>
             <a:r>
               <a:rPr lang="en-GB" sz="2800" dirty="0"/>
-              <a:t>, the Copy command, or the Copy Activity in Synapse Pipelines</a:t>
+              <a:t>, the Copy command, or the Copy data activity in Synapse Pipelines</a:t>
             </a:r>
           </a:p>
         </p:txBody>
@@ -42888,135 +43543,6 @@
     <p:extLst>
       <p:ext uri="{BB962C8B-B14F-4D97-AF65-F5344CB8AC3E}">
         <p14:creationId xmlns:p14="http://schemas.microsoft.com/office/powerpoint/2010/main" val="2592538289"/>
-      </p:ext>
-    </p:extLst>
-  </p:cSld>
-  <p:clrMapOvr>
-    <a:masterClrMapping/>
-  </p:clrMapOvr>
-</p:sld>
-</file>
-
-<file path=ppt/slides/slide5.xml><?xml version="1.0" encoding="utf-8"?>
-<p:sld xmlns:a="http://schemas.openxmlformats.org/drawingml/2006/main" xmlns:r="http://schemas.openxmlformats.org/officeDocument/2006/relationships" xmlns:p="http://schemas.openxmlformats.org/presentationml/2006/main">
-  <p:cSld>
-    <p:spTree>
-      <p:nvGrpSpPr>
-        <p:cNvPr id="1" name=""/>
-        <p:cNvGrpSpPr/>
-        <p:nvPr/>
-      </p:nvGrpSpPr>
-      <p:grpSpPr>
-        <a:xfrm>
-          <a:off x="0" y="0"/>
-          <a:ext cx="0" cy="0"/>
-          <a:chOff x="0" y="0"/>
-          <a:chExt cx="0" cy="0"/>
-        </a:xfrm>
-      </p:grpSpPr>
-      <p:sp>
-        <p:nvSpPr>
-          <p:cNvPr id="3" name="Subtitle 2">
-            <a:extLst>
-              <a:ext uri="{FF2B5EF4-FFF2-40B4-BE49-F238E27FC236}">
-                <a16:creationId xmlns:a16="http://schemas.microsoft.com/office/drawing/2014/main" id="{78BC2C14-5B54-4319-BA1D-46B0C6B5B674}"/>
-              </a:ext>
-            </a:extLst>
-          </p:cNvPr>
-          <p:cNvSpPr>
-            <a:spLocks noGrp="1"/>
-          </p:cNvSpPr>
-          <p:nvPr>
-            <p:ph type="subTitle" idx="1"/>
-          </p:nvPr>
-        </p:nvSpPr>
-        <p:spPr>
-          <a:xfrm>
-            <a:off x="1387813" y="5432612"/>
-            <a:ext cx="3937874" cy="649590"/>
-          </a:xfrm>
-        </p:spPr>
-        <p:txBody>
-          <a:bodyPr/>
-          <a:lstStyle/>
-          <a:p>
-            <a:r>
-              <a:rPr lang="en-US" dirty="0"/>
-              <a:t>Subtitle Goes Here</a:t>
-            </a:r>
-          </a:p>
-        </p:txBody>
-      </p:sp>
-      <p:sp>
-        <p:nvSpPr>
-          <p:cNvPr id="6" name="Text Placeholder 5">
-            <a:extLst>
-              <a:ext uri="{FF2B5EF4-FFF2-40B4-BE49-F238E27FC236}">
-                <a16:creationId xmlns:a16="http://schemas.microsoft.com/office/drawing/2014/main" id="{D2D209E3-1837-4C18-AED9-45330F063EC5}"/>
-              </a:ext>
-            </a:extLst>
-          </p:cNvPr>
-          <p:cNvSpPr>
-            <a:spLocks noGrp="1"/>
-          </p:cNvSpPr>
-          <p:nvPr>
-            <p:ph type="body" sz="quarter" idx="10"/>
-          </p:nvPr>
-        </p:nvSpPr>
-        <p:spPr>
-          <a:xfrm>
-            <a:off x="3280756" y="309563"/>
-            <a:ext cx="2377094" cy="2600325"/>
-          </a:xfrm>
-        </p:spPr>
-        <p:txBody>
-          <a:bodyPr/>
-          <a:lstStyle/>
-          <a:p>
-            <a:r>
-              <a:rPr lang="en-US" dirty="0"/>
-              <a:t>2</a:t>
-            </a:r>
-          </a:p>
-        </p:txBody>
-      </p:sp>
-      <p:sp>
-        <p:nvSpPr>
-          <p:cNvPr id="2" name="Title 1">
-            <a:extLst>
-              <a:ext uri="{FF2B5EF4-FFF2-40B4-BE49-F238E27FC236}">
-                <a16:creationId xmlns:a16="http://schemas.microsoft.com/office/drawing/2014/main" id="{21A99087-F939-4EAF-AD38-211701C7799F}"/>
-              </a:ext>
-            </a:extLst>
-          </p:cNvPr>
-          <p:cNvSpPr>
-            <a:spLocks noGrp="1"/>
-          </p:cNvSpPr>
-          <p:nvPr>
-            <p:ph type="ctrTitle"/>
-          </p:nvPr>
-        </p:nvSpPr>
-        <p:spPr>
-          <a:xfrm>
-            <a:off x="1222712" y="1806388"/>
-            <a:ext cx="4581188" cy="3439389"/>
-          </a:xfrm>
-        </p:spPr>
-        <p:txBody>
-          <a:bodyPr/>
-          <a:lstStyle/>
-          <a:p>
-            <a:r>
-              <a:rPr lang="en-GB" dirty="0"/>
-              <a:t>Petabyte-scale ingestion with Azure Data Factory/Synapse Pipelines</a:t>
-            </a:r>
-          </a:p>
-        </p:txBody>
-      </p:sp>
-    </p:spTree>
-    <p:extLst>
-      <p:ext uri="{BB962C8B-B14F-4D97-AF65-F5344CB8AC3E}">
-        <p14:creationId xmlns:p14="http://schemas.microsoft.com/office/powerpoint/2010/main" val="2118431511"/>
       </p:ext>
     </p:extLst>
   </p:cSld>
@@ -43285,7 +43811,7 @@
           <a:p>
             <a:r>
               <a:rPr lang="en-GB" dirty="0"/>
-              <a:t>Allows use of SSIS and SSIS Integration Runtime and SSIS package activity</a:t>
+              <a:t>Needs CONTROL permission</a:t>
             </a:r>
           </a:p>
           <a:p>
@@ -43294,17 +43820,25 @@
           <a:p>
             <a:r>
               <a:rPr lang="en-GB" dirty="0"/>
-              <a:t>Supports Cross-region Integration Runtime (Data Flows)</a:t>
-            </a:r>
-            <a:br>
+              <a:t>How row width limits</a:t>
+            </a:r>
+          </a:p>
+          <a:p>
+            <a:endParaRPr lang="en-GB" dirty="0"/>
+          </a:p>
+          <a:p>
+            <a:r>
               <a:rPr lang="en-GB" dirty="0"/>
-            </a:br>
+              <a:t>No delimiters within text</a:t>
+            </a:r>
+          </a:p>
+          <a:p>
             <a:endParaRPr lang="en-GB" dirty="0"/>
           </a:p>
           <a:p>
             <a:r>
               <a:rPr lang="en-GB" dirty="0"/>
-              <a:t>Integration Runtime sharing across different data factories</a:t>
+              <a:t>Fixed line delimiter</a:t>
             </a:r>
           </a:p>
           <a:p>
@@ -43313,7 +43847,7 @@
           <a:p>
             <a:r>
               <a:rPr lang="en-GB" dirty="0"/>
-              <a:t>Provides support for Power Query Activity</a:t>
+              <a:t>Complex to set up in code</a:t>
             </a:r>
           </a:p>
         </p:txBody>
@@ -43347,9 +43881,10 @@
           <a:lstStyle/>
           <a:p>
             <a:r>
-              <a:rPr lang="en-US" dirty="0"/>
-              <a:t>Azure Data Factory</a:t>
-            </a:r>
+              <a:rPr lang="en-US" dirty="0" err="1"/>
+              <a:t>PolyBase</a:t>
+            </a:r>
+            <a:endParaRPr lang="en-US" dirty="0"/>
           </a:p>
         </p:txBody>
       </p:sp>
@@ -43381,12 +43916,44 @@
           <a:p>
             <a:r>
               <a:rPr lang="en-GB" dirty="0"/>
-              <a:t>Monitoring of Spark jobs for Data Flows leveraging Synapse Spark pools</a:t>
-            </a:r>
-            <a:br>
+              <a:t>Relaxed permission</a:t>
+            </a:r>
+          </a:p>
+          <a:p>
+            <a:endParaRPr lang="en-GB" dirty="0"/>
+          </a:p>
+          <a:p>
+            <a:r>
               <a:rPr lang="en-GB" dirty="0"/>
-            </a:br>
+              <a:t>No row width limit</a:t>
+            </a:r>
+          </a:p>
+          <a:p>
             <a:endParaRPr lang="en-GB" dirty="0"/>
+          </a:p>
+          <a:p>
+            <a:r>
+              <a:rPr lang="en-GB" dirty="0"/>
+              <a:t>Supports delimiters in text</a:t>
+            </a:r>
+          </a:p>
+          <a:p>
+            <a:endParaRPr lang="en-GB" dirty="0"/>
+          </a:p>
+          <a:p>
+            <a:r>
+              <a:rPr lang="en-GB" dirty="0"/>
+              <a:t>Supports custom column and row delimiters</a:t>
+            </a:r>
+          </a:p>
+          <a:p>
+            <a:endParaRPr lang="en-GB" dirty="0"/>
+          </a:p>
+          <a:p>
+            <a:r>
+              <a:rPr lang="en-GB" dirty="0"/>
+              <a:t>Reduces amount of code</a:t>
+            </a:r>
           </a:p>
         </p:txBody>
       </p:sp>
@@ -43418,7 +43985,7 @@
           <a:p>
             <a:r>
               <a:rPr lang="en-US" dirty="0"/>
-              <a:t>Synapse Pipelines</a:t>
+              <a:t>COPY statement</a:t>
             </a:r>
           </a:p>
         </p:txBody>
@@ -43453,7 +44020,15 @@
           <a:p>
             <a:r>
               <a:rPr lang="en-GB" dirty="0"/>
-              <a:t>Comparing Azure Data Factory with Synapse Pipelines</a:t>
+              <a:t>Differences between </a:t>
+            </a:r>
+            <a:r>
+              <a:rPr lang="en-GB" dirty="0" err="1"/>
+              <a:t>PolyBase</a:t>
+            </a:r>
+            <a:r>
+              <a:rPr lang="en-GB" dirty="0"/>
+              <a:t> and the COPY statement</a:t>
             </a:r>
             <a:endParaRPr lang="en-US" dirty="0"/>
           </a:p>
@@ -43462,7 +44037,7 @@
     </p:spTree>
     <p:extLst>
       <p:ext uri="{BB962C8B-B14F-4D97-AF65-F5344CB8AC3E}">
-        <p14:creationId xmlns:p14="http://schemas.microsoft.com/office/powerpoint/2010/main" val="2192128256"/>
+        <p14:creationId xmlns:p14="http://schemas.microsoft.com/office/powerpoint/2010/main" val="3634589903"/>
       </p:ext>
     </p:extLst>
   </p:cSld>
@@ -43491,6 +44066,279 @@
       </p:grpSpPr>
       <p:sp>
         <p:nvSpPr>
+          <p:cNvPr id="3" name="Subtitle 2">
+            <a:extLst>
+              <a:ext uri="{FF2B5EF4-FFF2-40B4-BE49-F238E27FC236}">
+                <a16:creationId xmlns:a16="http://schemas.microsoft.com/office/drawing/2014/main" id="{78BC2C14-5B54-4319-BA1D-46B0C6B5B674}"/>
+              </a:ext>
+            </a:extLst>
+          </p:cNvPr>
+          <p:cNvSpPr>
+            <a:spLocks noGrp="1"/>
+          </p:cNvSpPr>
+          <p:nvPr>
+            <p:ph type="subTitle" idx="1"/>
+          </p:nvPr>
+        </p:nvSpPr>
+        <p:spPr>
+          <a:xfrm>
+            <a:off x="1387813" y="5432612"/>
+            <a:ext cx="3937874" cy="649590"/>
+          </a:xfrm>
+        </p:spPr>
+        <p:txBody>
+          <a:bodyPr/>
+          <a:lstStyle/>
+          <a:p>
+            <a:r>
+              <a:rPr lang="en-US" dirty="0"/>
+              <a:t>Subtitle Goes Here</a:t>
+            </a:r>
+          </a:p>
+        </p:txBody>
+      </p:sp>
+      <p:sp>
+        <p:nvSpPr>
+          <p:cNvPr id="6" name="Text Placeholder 5">
+            <a:extLst>
+              <a:ext uri="{FF2B5EF4-FFF2-40B4-BE49-F238E27FC236}">
+                <a16:creationId xmlns:a16="http://schemas.microsoft.com/office/drawing/2014/main" id="{D2D209E3-1837-4C18-AED9-45330F063EC5}"/>
+              </a:ext>
+            </a:extLst>
+          </p:cNvPr>
+          <p:cNvSpPr>
+            <a:spLocks noGrp="1"/>
+          </p:cNvSpPr>
+          <p:nvPr>
+            <p:ph type="body" sz="quarter" idx="10"/>
+          </p:nvPr>
+        </p:nvSpPr>
+        <p:spPr>
+          <a:xfrm>
+            <a:off x="3280756" y="309563"/>
+            <a:ext cx="2377094" cy="2600325"/>
+          </a:xfrm>
+        </p:spPr>
+        <p:txBody>
+          <a:bodyPr/>
+          <a:lstStyle/>
+          <a:p>
+            <a:r>
+              <a:rPr lang="en-US" dirty="0"/>
+              <a:t>2</a:t>
+            </a:r>
+          </a:p>
+        </p:txBody>
+      </p:sp>
+      <p:sp>
+        <p:nvSpPr>
+          <p:cNvPr id="2" name="Title 1">
+            <a:extLst>
+              <a:ext uri="{FF2B5EF4-FFF2-40B4-BE49-F238E27FC236}">
+                <a16:creationId xmlns:a16="http://schemas.microsoft.com/office/drawing/2014/main" id="{21A99087-F939-4EAF-AD38-211701C7799F}"/>
+              </a:ext>
+            </a:extLst>
+          </p:cNvPr>
+          <p:cNvSpPr>
+            <a:spLocks noGrp="1"/>
+          </p:cNvSpPr>
+          <p:nvPr>
+            <p:ph type="ctrTitle"/>
+          </p:nvPr>
+        </p:nvSpPr>
+        <p:spPr>
+          <a:xfrm>
+            <a:off x="1222712" y="1806388"/>
+            <a:ext cx="4581188" cy="3439389"/>
+          </a:xfrm>
+        </p:spPr>
+        <p:txBody>
+          <a:bodyPr/>
+          <a:lstStyle/>
+          <a:p>
+            <a:r>
+              <a:rPr lang="en-GB" dirty="0"/>
+              <a:t>Petabyte-scale ingestion with Azure Data Factory/Synapse Pipelines</a:t>
+            </a:r>
+          </a:p>
+        </p:txBody>
+      </p:sp>
+    </p:spTree>
+    <p:extLst>
+      <p:ext uri="{BB962C8B-B14F-4D97-AF65-F5344CB8AC3E}">
+        <p14:creationId xmlns:p14="http://schemas.microsoft.com/office/powerpoint/2010/main" val="2118431511"/>
+      </p:ext>
+    </p:extLst>
+  </p:cSld>
+  <p:clrMapOvr>
+    <a:masterClrMapping/>
+  </p:clrMapOvr>
+</p:sld>
+</file>
+
+<file path=ppt/slides/slide8.xml><?xml version="1.0" encoding="utf-8"?>
+<p:sld xmlns:a="http://schemas.openxmlformats.org/drawingml/2006/main" xmlns:r="http://schemas.openxmlformats.org/officeDocument/2006/relationships" xmlns:p="http://schemas.openxmlformats.org/presentationml/2006/main">
+  <p:cSld>
+    <p:spTree>
+      <p:nvGrpSpPr>
+        <p:cNvPr id="1" name=""/>
+        <p:cNvGrpSpPr/>
+        <p:nvPr/>
+      </p:nvGrpSpPr>
+      <p:grpSpPr>
+        <a:xfrm>
+          <a:off x="0" y="0"/>
+          <a:ext cx="0" cy="0"/>
+          <a:chOff x="0" y="0"/>
+          <a:chExt cx="0" cy="0"/>
+        </a:xfrm>
+      </p:grpSpPr>
+      <p:sp>
+        <p:nvSpPr>
+          <p:cNvPr id="11" name="Rectangle 10">
+            <a:extLst>
+              <a:ext uri="{FF2B5EF4-FFF2-40B4-BE49-F238E27FC236}">
+                <a16:creationId xmlns:a16="http://schemas.microsoft.com/office/drawing/2014/main" id="{79B1B558-BF82-4E7F-94CF-BE2882BCE50E}"/>
+              </a:ext>
+            </a:extLst>
+          </p:cNvPr>
+          <p:cNvSpPr/>
+          <p:nvPr/>
+        </p:nvSpPr>
+        <p:spPr>
+          <a:xfrm>
+            <a:off x="6539345" y="1829430"/>
+            <a:ext cx="5652655" cy="811540"/>
+          </a:xfrm>
+          <a:prstGeom prst="rect">
+            <a:avLst/>
+          </a:prstGeom>
+          <a:solidFill>
+            <a:schemeClr val="accent3"/>
+          </a:solidFill>
+          <a:ln>
+            <a:noFill/>
+          </a:ln>
+        </p:spPr>
+        <p:style>
+          <a:lnRef idx="2">
+            <a:schemeClr val="accent1">
+              <a:shade val="50000"/>
+            </a:schemeClr>
+          </a:lnRef>
+          <a:fillRef idx="1">
+            <a:schemeClr val="accent1"/>
+          </a:fillRef>
+          <a:effectRef idx="0">
+            <a:schemeClr val="accent1"/>
+          </a:effectRef>
+          <a:fontRef idx="minor">
+            <a:schemeClr val="lt1"/>
+          </a:fontRef>
+        </p:style>
+        <p:txBody>
+          <a:bodyPr rtlCol="0" anchor="ctr"/>
+          <a:lstStyle/>
+          <a:p>
+            <a:pPr algn="ctr"/>
+            <a:endParaRPr lang="en-US"/>
+          </a:p>
+        </p:txBody>
+      </p:sp>
+      <p:sp>
+        <p:nvSpPr>
+          <p:cNvPr id="13" name="Rectangle 12">
+            <a:extLst>
+              <a:ext uri="{FF2B5EF4-FFF2-40B4-BE49-F238E27FC236}">
+                <a16:creationId xmlns:a16="http://schemas.microsoft.com/office/drawing/2014/main" id="{38D3B008-538C-4221-B6CC-D50EE1A24CF8}"/>
+              </a:ext>
+            </a:extLst>
+          </p:cNvPr>
+          <p:cNvSpPr/>
+          <p:nvPr/>
+        </p:nvSpPr>
+        <p:spPr>
+          <a:xfrm>
+            <a:off x="0" y="1829430"/>
+            <a:ext cx="5652655" cy="811540"/>
+          </a:xfrm>
+          <a:prstGeom prst="rect">
+            <a:avLst/>
+          </a:prstGeom>
+          <a:ln>
+            <a:noFill/>
+          </a:ln>
+        </p:spPr>
+        <p:style>
+          <a:lnRef idx="2">
+            <a:schemeClr val="accent1">
+              <a:shade val="50000"/>
+            </a:schemeClr>
+          </a:lnRef>
+          <a:fillRef idx="1">
+            <a:schemeClr val="accent1"/>
+          </a:fillRef>
+          <a:effectRef idx="0">
+            <a:schemeClr val="accent1"/>
+          </a:effectRef>
+          <a:fontRef idx="minor">
+            <a:schemeClr val="lt1"/>
+          </a:fontRef>
+        </p:style>
+        <p:txBody>
+          <a:bodyPr rtlCol="0" anchor="ctr"/>
+          <a:lstStyle/>
+          <a:p>
+            <a:pPr algn="ctr"/>
+            <a:endParaRPr lang="en-US"/>
+          </a:p>
+        </p:txBody>
+      </p:sp>
+      <p:cxnSp>
+        <p:nvCxnSpPr>
+          <p:cNvPr id="14" name="Straight Connector 13">
+            <a:extLst>
+              <a:ext uri="{FF2B5EF4-FFF2-40B4-BE49-F238E27FC236}">
+                <a16:creationId xmlns:a16="http://schemas.microsoft.com/office/drawing/2014/main" id="{EBDE7C79-9AD0-4B95-88DD-33F7D8E1976E}"/>
+              </a:ext>
+            </a:extLst>
+          </p:cNvPr>
+          <p:cNvCxnSpPr>
+            <a:cxnSpLocks/>
+          </p:cNvCxnSpPr>
+          <p:nvPr/>
+        </p:nvCxnSpPr>
+        <p:spPr>
+          <a:xfrm>
+            <a:off x="6096000" y="1828800"/>
+            <a:ext cx="0" cy="4114800"/>
+          </a:xfrm>
+          <a:prstGeom prst="line">
+            <a:avLst/>
+          </a:prstGeom>
+          <a:ln w="12700">
+            <a:solidFill>
+              <a:schemeClr val="tx1"/>
+            </a:solidFill>
+          </a:ln>
+        </p:spPr>
+        <p:style>
+          <a:lnRef idx="1">
+            <a:schemeClr val="accent1"/>
+          </a:lnRef>
+          <a:fillRef idx="0">
+            <a:schemeClr val="accent1"/>
+          </a:fillRef>
+          <a:effectRef idx="0">
+            <a:schemeClr val="accent1"/>
+          </a:effectRef>
+          <a:fontRef idx="minor">
+            <a:schemeClr val="tx1"/>
+          </a:fontRef>
+        </p:style>
+      </p:cxnSp>
+      <p:sp>
+        <p:nvSpPr>
           <p:cNvPr id="23" name="Footer Placeholder 22">
             <a:extLst>
               <a:ext uri="{FF2B5EF4-FFF2-40B4-BE49-F238E27FC236}">
@@ -43551,7 +44399,309 @@
             <a:fld id="{00F9DAA1-1DF7-43E0-8E29-0CE1148553C7}" type="slidenum">
               <a:rPr lang="en-US" smtClean="0"/>
               <a:pPr/>
-              <a:t>7</a:t>
+              <a:t>8</a:t>
+            </a:fld>
+            <a:endParaRPr lang="en-US"/>
+          </a:p>
+        </p:txBody>
+      </p:sp>
+      <p:sp>
+        <p:nvSpPr>
+          <p:cNvPr id="6" name="Content Placeholder 5">
+            <a:extLst>
+              <a:ext uri="{FF2B5EF4-FFF2-40B4-BE49-F238E27FC236}">
+                <a16:creationId xmlns:a16="http://schemas.microsoft.com/office/drawing/2014/main" id="{9D982996-F328-4ABC-A205-3C7049F27B3E}"/>
+              </a:ext>
+            </a:extLst>
+          </p:cNvPr>
+          <p:cNvSpPr>
+            <a:spLocks noGrp="1"/>
+          </p:cNvSpPr>
+          <p:nvPr>
+            <p:ph type="body" sz="quarter" idx="10"/>
+          </p:nvPr>
+        </p:nvSpPr>
+        <p:spPr>
+          <a:xfrm>
+            <a:off x="647700" y="2905066"/>
+            <a:ext cx="4912534" cy="3038534"/>
+          </a:xfrm>
+        </p:spPr>
+        <p:txBody>
+          <a:bodyPr>
+            <a:normAutofit/>
+          </a:bodyPr>
+          <a:lstStyle/>
+          <a:p>
+            <a:r>
+              <a:rPr lang="en-GB" dirty="0"/>
+              <a:t>Allows use of SSIS and SSIS Integration Runtime and SSIS package activity</a:t>
+            </a:r>
+          </a:p>
+          <a:p>
+            <a:endParaRPr lang="en-GB" dirty="0"/>
+          </a:p>
+          <a:p>
+            <a:r>
+              <a:rPr lang="en-GB" dirty="0"/>
+              <a:t>Supports Cross-region Integration Runtime (Data Flows)</a:t>
+            </a:r>
+            <a:br>
+              <a:rPr lang="en-GB" dirty="0"/>
+            </a:br>
+            <a:endParaRPr lang="en-GB" dirty="0"/>
+          </a:p>
+          <a:p>
+            <a:r>
+              <a:rPr lang="en-GB" dirty="0"/>
+              <a:t>Integration Runtime sharing across different data factories</a:t>
+            </a:r>
+          </a:p>
+          <a:p>
+            <a:endParaRPr lang="en-GB" dirty="0"/>
+          </a:p>
+          <a:p>
+            <a:r>
+              <a:rPr lang="en-GB" dirty="0"/>
+              <a:t>Provides support for Power Query Activity</a:t>
+            </a:r>
+          </a:p>
+        </p:txBody>
+      </p:sp>
+      <p:sp>
+        <p:nvSpPr>
+          <p:cNvPr id="7" name="Content Placeholder 6">
+            <a:extLst>
+              <a:ext uri="{FF2B5EF4-FFF2-40B4-BE49-F238E27FC236}">
+                <a16:creationId xmlns:a16="http://schemas.microsoft.com/office/drawing/2014/main" id="{0D2D3EC8-50BA-4FD9-A167-BD69E36816F8}"/>
+              </a:ext>
+            </a:extLst>
+          </p:cNvPr>
+          <p:cNvSpPr>
+            <a:spLocks noGrp="1"/>
+          </p:cNvSpPr>
+          <p:nvPr>
+            <p:ph type="body" sz="quarter" idx="16"/>
+          </p:nvPr>
+        </p:nvSpPr>
+        <p:spPr>
+          <a:xfrm>
+            <a:off x="647700" y="1828800"/>
+            <a:ext cx="4912534" cy="795130"/>
+          </a:xfrm>
+        </p:spPr>
+        <p:txBody>
+          <a:bodyPr>
+            <a:normAutofit/>
+          </a:bodyPr>
+          <a:lstStyle/>
+          <a:p>
+            <a:r>
+              <a:rPr lang="en-US" dirty="0"/>
+              <a:t>Azure Data Factory</a:t>
+            </a:r>
+          </a:p>
+        </p:txBody>
+      </p:sp>
+      <p:sp>
+        <p:nvSpPr>
+          <p:cNvPr id="2" name="Content Placeholder 1">
+            <a:extLst>
+              <a:ext uri="{FF2B5EF4-FFF2-40B4-BE49-F238E27FC236}">
+                <a16:creationId xmlns:a16="http://schemas.microsoft.com/office/drawing/2014/main" id="{FFF8E607-DEFA-4726-9900-BF36257F57CE}"/>
+              </a:ext>
+            </a:extLst>
+          </p:cNvPr>
+          <p:cNvSpPr>
+            <a:spLocks noGrp="1"/>
+          </p:cNvSpPr>
+          <p:nvPr>
+            <p:ph type="body" sz="quarter" idx="17"/>
+          </p:nvPr>
+        </p:nvSpPr>
+        <p:spPr>
+          <a:xfrm>
+            <a:off x="6631766" y="2905066"/>
+            <a:ext cx="4912534" cy="3038534"/>
+          </a:xfrm>
+        </p:spPr>
+        <p:txBody>
+          <a:bodyPr/>
+          <a:lstStyle/>
+          <a:p>
+            <a:r>
+              <a:rPr lang="en-GB" dirty="0"/>
+              <a:t>Monitoring of Spark jobs for Data Flows leveraging Synapse Spark pools</a:t>
+            </a:r>
+            <a:br>
+              <a:rPr lang="en-GB" dirty="0"/>
+            </a:br>
+            <a:endParaRPr lang="en-GB" dirty="0"/>
+          </a:p>
+        </p:txBody>
+      </p:sp>
+      <p:sp>
+        <p:nvSpPr>
+          <p:cNvPr id="3" name="Content Placeholder 2">
+            <a:extLst>
+              <a:ext uri="{FF2B5EF4-FFF2-40B4-BE49-F238E27FC236}">
+                <a16:creationId xmlns:a16="http://schemas.microsoft.com/office/drawing/2014/main" id="{6CFACEB2-BB77-417B-A417-23AFBA929345}"/>
+              </a:ext>
+            </a:extLst>
+          </p:cNvPr>
+          <p:cNvSpPr>
+            <a:spLocks noGrp="1"/>
+          </p:cNvSpPr>
+          <p:nvPr>
+            <p:ph type="body" sz="quarter" idx="18"/>
+          </p:nvPr>
+        </p:nvSpPr>
+        <p:spPr>
+          <a:xfrm>
+            <a:off x="6631766" y="1828800"/>
+            <a:ext cx="4912534" cy="795130"/>
+          </a:xfrm>
+        </p:spPr>
+        <p:txBody>
+          <a:bodyPr/>
+          <a:lstStyle/>
+          <a:p>
+            <a:r>
+              <a:rPr lang="en-US" dirty="0"/>
+              <a:t>Synapse Pipelines</a:t>
+            </a:r>
+          </a:p>
+        </p:txBody>
+      </p:sp>
+      <p:sp>
+        <p:nvSpPr>
+          <p:cNvPr id="5" name="Title 4">
+            <a:extLst>
+              <a:ext uri="{FF2B5EF4-FFF2-40B4-BE49-F238E27FC236}">
+                <a16:creationId xmlns:a16="http://schemas.microsoft.com/office/drawing/2014/main" id="{42E837BB-922D-4315-A68F-DCF835BA7C4E}"/>
+              </a:ext>
+            </a:extLst>
+          </p:cNvPr>
+          <p:cNvSpPr>
+            <a:spLocks noGrp="1"/>
+          </p:cNvSpPr>
+          <p:nvPr>
+            <p:ph type="title"/>
+          </p:nvPr>
+        </p:nvSpPr>
+        <p:spPr>
+          <a:xfrm>
+            <a:off x="652462" y="346076"/>
+            <a:ext cx="11234738" cy="568324"/>
+          </a:xfrm>
+        </p:spPr>
+        <p:txBody>
+          <a:bodyPr>
+            <a:normAutofit/>
+          </a:bodyPr>
+          <a:lstStyle/>
+          <a:p>
+            <a:r>
+              <a:rPr lang="en-GB" dirty="0"/>
+              <a:t>Comparing Azure Data Factory with Synapse Pipelines</a:t>
+            </a:r>
+            <a:endParaRPr lang="en-US" dirty="0"/>
+          </a:p>
+        </p:txBody>
+      </p:sp>
+    </p:spTree>
+    <p:extLst>
+      <p:ext uri="{BB962C8B-B14F-4D97-AF65-F5344CB8AC3E}">
+        <p14:creationId xmlns:p14="http://schemas.microsoft.com/office/powerpoint/2010/main" val="2192128256"/>
+      </p:ext>
+    </p:extLst>
+  </p:cSld>
+  <p:clrMapOvr>
+    <a:masterClrMapping/>
+  </p:clrMapOvr>
+</p:sld>
+</file>
+
+<file path=ppt/slides/slide9.xml><?xml version="1.0" encoding="utf-8"?>
+<p:sld xmlns:a="http://schemas.openxmlformats.org/drawingml/2006/main" xmlns:r="http://schemas.openxmlformats.org/officeDocument/2006/relationships" xmlns:p="http://schemas.openxmlformats.org/presentationml/2006/main">
+  <p:cSld>
+    <p:spTree>
+      <p:nvGrpSpPr>
+        <p:cNvPr id="1" name=""/>
+        <p:cNvGrpSpPr/>
+        <p:nvPr/>
+      </p:nvGrpSpPr>
+      <p:grpSpPr>
+        <a:xfrm>
+          <a:off x="0" y="0"/>
+          <a:ext cx="0" cy="0"/>
+          <a:chOff x="0" y="0"/>
+          <a:chExt cx="0" cy="0"/>
+        </a:xfrm>
+      </p:grpSpPr>
+      <p:sp>
+        <p:nvSpPr>
+          <p:cNvPr id="23" name="Footer Placeholder 22">
+            <a:extLst>
+              <a:ext uri="{FF2B5EF4-FFF2-40B4-BE49-F238E27FC236}">
+                <a16:creationId xmlns:a16="http://schemas.microsoft.com/office/drawing/2014/main" id="{3A712A40-325E-4D37-9A92-921BD05BF7C5}"/>
+              </a:ext>
+            </a:extLst>
+          </p:cNvPr>
+          <p:cNvSpPr>
+            <a:spLocks noGrp="1"/>
+          </p:cNvSpPr>
+          <p:nvPr>
+            <p:ph type="ftr" sz="quarter" idx="3"/>
+          </p:nvPr>
+        </p:nvSpPr>
+        <p:spPr>
+          <a:xfrm>
+            <a:off x="7234764" y="6466371"/>
+            <a:ext cx="4114800" cy="331932"/>
+          </a:xfrm>
+        </p:spPr>
+        <p:txBody>
+          <a:bodyPr/>
+          <a:lstStyle/>
+          <a:p>
+            <a:r>
+              <a:rPr lang="en-US"/>
+              <a:t>WWW.SOLLIANCE.NET</a:t>
+            </a:r>
+          </a:p>
+        </p:txBody>
+      </p:sp>
+      <p:sp>
+        <p:nvSpPr>
+          <p:cNvPr id="24" name="Slide Number Placeholder 23">
+            <a:extLst>
+              <a:ext uri="{FF2B5EF4-FFF2-40B4-BE49-F238E27FC236}">
+                <a16:creationId xmlns:a16="http://schemas.microsoft.com/office/drawing/2014/main" id="{53D9F9D2-2203-4E3C-A021-F26D0D9ABDB5}"/>
+              </a:ext>
+            </a:extLst>
+          </p:cNvPr>
+          <p:cNvSpPr>
+            <a:spLocks noGrp="1"/>
+          </p:cNvSpPr>
+          <p:nvPr>
+            <p:ph type="sldNum" sz="quarter" idx="4"/>
+          </p:nvPr>
+        </p:nvSpPr>
+        <p:spPr>
+          <a:xfrm>
+            <a:off x="11636830" y="6466371"/>
+            <a:ext cx="436355" cy="331932"/>
+          </a:xfrm>
+        </p:spPr>
+        <p:txBody>
+          <a:bodyPr/>
+          <a:lstStyle/>
+          <a:p>
+            <a:fld id="{00F9DAA1-1DF7-43E0-8E29-0CE1148553C7}" type="slidenum">
+              <a:rPr lang="en-US" smtClean="0"/>
+              <a:pPr/>
+              <a:t>9</a:t>
             </a:fld>
             <a:endParaRPr lang="en-US"/>
           </a:p>
@@ -43580,12 +44730,14 @@
           </a:xfrm>
         </p:spPr>
         <p:txBody>
-          <a:bodyPr/>
+          <a:bodyPr>
+            <a:normAutofit/>
+          </a:bodyPr>
           <a:lstStyle/>
           <a:p>
             <a:r>
               <a:rPr lang="en-US" dirty="0"/>
-              <a:t>Petabyte-scale ingestion with ADF/Synapse Pipelines</a:t>
+              <a:t>Petabyte-scale ingestion with the Copy data activity</a:t>
             </a:r>
           </a:p>
         </p:txBody>
@@ -43630,177 +44782,6 @@
   <p:clrMapOvr>
     <a:masterClrMapping/>
   </p:clrMapOvr>
-</p:sld>
-</file>
-
-<file path=ppt/slides/slide8.xml><?xml version="1.0" encoding="utf-8"?>
-<p:sld xmlns:a="http://schemas.openxmlformats.org/drawingml/2006/main" xmlns:r="http://schemas.openxmlformats.org/officeDocument/2006/relationships" xmlns:p="http://schemas.openxmlformats.org/presentationml/2006/main">
-  <p:cSld>
-    <p:spTree>
-      <p:nvGrpSpPr>
-        <p:cNvPr id="1" name=""/>
-        <p:cNvGrpSpPr/>
-        <p:nvPr/>
-      </p:nvGrpSpPr>
-      <p:grpSpPr>
-        <a:xfrm>
-          <a:off x="0" y="0"/>
-          <a:ext cx="0" cy="0"/>
-          <a:chOff x="0" y="0"/>
-          <a:chExt cx="0" cy="0"/>
-        </a:xfrm>
-      </p:grpSpPr>
-      <p:sp>
-        <p:nvSpPr>
-          <p:cNvPr id="2" name="Title 1">
-            <a:extLst>
-              <a:ext uri="{FF2B5EF4-FFF2-40B4-BE49-F238E27FC236}">
-                <a16:creationId xmlns:a16="http://schemas.microsoft.com/office/drawing/2014/main" id="{21A99087-F939-4EAF-AD38-211701C7799F}"/>
-              </a:ext>
-            </a:extLst>
-          </p:cNvPr>
-          <p:cNvSpPr>
-            <a:spLocks noGrp="1"/>
-          </p:cNvSpPr>
-          <p:nvPr>
-            <p:ph type="ctrTitle"/>
-          </p:nvPr>
-        </p:nvSpPr>
-        <p:spPr>
-          <a:xfrm>
-            <a:off x="1387813" y="3415452"/>
-            <a:ext cx="9144000" cy="1096613"/>
-          </a:xfrm>
-        </p:spPr>
-        <p:txBody>
-          <a:bodyPr>
-            <a:normAutofit fontScale="90000"/>
-          </a:bodyPr>
-          <a:lstStyle/>
-          <a:p>
-            <a:r>
-              <a:rPr lang="en-US" dirty="0"/>
-              <a:t>LAB: Ingest and load data into the data warehouse</a:t>
-            </a:r>
-          </a:p>
-        </p:txBody>
-      </p:sp>
-      <p:sp>
-        <p:nvSpPr>
-          <p:cNvPr id="3" name="Subtitle 2">
-            <a:extLst>
-              <a:ext uri="{FF2B5EF4-FFF2-40B4-BE49-F238E27FC236}">
-                <a16:creationId xmlns:a16="http://schemas.microsoft.com/office/drawing/2014/main" id="{78BC2C14-5B54-4319-BA1D-46B0C6B5B674}"/>
-              </a:ext>
-            </a:extLst>
-          </p:cNvPr>
-          <p:cNvSpPr>
-            <a:spLocks noGrp="1"/>
-          </p:cNvSpPr>
-          <p:nvPr>
-            <p:ph type="subTitle" idx="1"/>
-          </p:nvPr>
-        </p:nvSpPr>
-        <p:spPr>
-          <a:xfrm>
-            <a:off x="1387813" y="4843830"/>
-            <a:ext cx="9144000" cy="531554"/>
-          </a:xfrm>
-        </p:spPr>
-        <p:txBody>
-          <a:bodyPr/>
-          <a:lstStyle/>
-          <a:p>
-            <a:r>
-              <a:rPr lang="en-US" dirty="0"/>
-              <a:t>60 minutes</a:t>
-            </a:r>
-          </a:p>
-        </p:txBody>
-      </p:sp>
-    </p:spTree>
-    <p:extLst>
-      <p:ext uri="{BB962C8B-B14F-4D97-AF65-F5344CB8AC3E}">
-        <p14:creationId xmlns:p14="http://schemas.microsoft.com/office/powerpoint/2010/main" val="86463890"/>
-      </p:ext>
-    </p:extLst>
-  </p:cSld>
-  <p:clrMapOvr>
-    <a:masterClrMapping/>
-  </p:clrMapOvr>
-</p:sld>
-</file>
-
-<file path=ppt/slides/slide9.xml><?xml version="1.0" encoding="utf-8"?>
-<p:sld xmlns:a="http://schemas.openxmlformats.org/drawingml/2006/main" xmlns:r="http://schemas.openxmlformats.org/officeDocument/2006/relationships" xmlns:p="http://schemas.openxmlformats.org/presentationml/2006/main">
-  <p:cSld>
-    <p:spTree>
-      <p:nvGrpSpPr>
-        <p:cNvPr id="1" name=""/>
-        <p:cNvGrpSpPr/>
-        <p:nvPr/>
-      </p:nvGrpSpPr>
-      <p:grpSpPr>
-        <a:xfrm>
-          <a:off x="0" y="0"/>
-          <a:ext cx="0" cy="0"/>
-          <a:chOff x="0" y="0"/>
-          <a:chExt cx="0" cy="0"/>
-        </a:xfrm>
-      </p:grpSpPr>
-      <p:sp>
-        <p:nvSpPr>
-          <p:cNvPr id="5" name="Text Placeholder 4">
-            <a:extLst>
-              <a:ext uri="{FF2B5EF4-FFF2-40B4-BE49-F238E27FC236}">
-                <a16:creationId xmlns:a16="http://schemas.microsoft.com/office/drawing/2014/main" id="{EC99176B-B077-CD47-B52F-31E096175EF2}"/>
-              </a:ext>
-            </a:extLst>
-          </p:cNvPr>
-          <p:cNvSpPr>
-            <a:spLocks noGrp="1"/>
-          </p:cNvSpPr>
-          <p:nvPr>
-            <p:ph type="body" sz="quarter" idx="12"/>
-          </p:nvPr>
-        </p:nvSpPr>
-        <p:spPr>
-          <a:xfrm>
-            <a:off x="352927" y="6311900"/>
-            <a:ext cx="10784973" cy="204353"/>
-          </a:xfrm>
-        </p:spPr>
-        <p:txBody>
-          <a:bodyPr/>
-          <a:lstStyle/>
-          <a:p>
-            <a:r>
-              <a:rPr lang="en-GB" dirty="0">
-                <a:hlinkClick r:id="rId3"/>
-              </a:rPr>
-              <a:t>Build data analytics solutions using Azure Synapse serverless SQL pools - Learn | Microsoft Docs</a:t>
-            </a:r>
-            <a:endParaRPr lang="en-US" dirty="0">
-              <a:solidFill>
-                <a:srgbClr val="0478D4"/>
-              </a:solidFill>
-            </a:endParaRPr>
-          </a:p>
-        </p:txBody>
-      </p:sp>
-    </p:spTree>
-    <p:extLst>
-      <p:ext uri="{BB962C8B-B14F-4D97-AF65-F5344CB8AC3E}">
-        <p14:creationId xmlns:p14="http://schemas.microsoft.com/office/powerpoint/2010/main" val="3747424516"/>
-      </p:ext>
-    </p:extLst>
-  </p:cSld>
-  <p:clrMapOvr>
-    <a:masterClrMapping/>
-  </p:clrMapOvr>
-  <p:transition>
-    <p:fade/>
-  </p:transition>
 </p:sld>
 </file>
 

</xml_diff>